<commit_message>
More Input slides, need web form slides added
</commit_message>
<xml_diff>
--- a/355/355.pptx
+++ b/355/355.pptx
@@ -5,10 +5,10 @@
     <p:sldMasterId id="2147483801" r:id="rId1"/>
   </p:sldMasterIdLst>
   <p:notesMasterIdLst>
-    <p:notesMasterId r:id="rId12"/>
+    <p:notesMasterId r:id="rId16"/>
   </p:notesMasterIdLst>
   <p:handoutMasterIdLst>
-    <p:handoutMasterId r:id="rId13"/>
+    <p:handoutMasterId r:id="rId17"/>
   </p:handoutMasterIdLst>
   <p:sldIdLst>
     <p:sldId id="256" r:id="rId2"/>
@@ -17,10 +17,14 @@
     <p:sldId id="340" r:id="rId5"/>
     <p:sldId id="337" r:id="rId6"/>
     <p:sldId id="338" r:id="rId7"/>
-    <p:sldId id="339" r:id="rId8"/>
-    <p:sldId id="333" r:id="rId9"/>
-    <p:sldId id="328" r:id="rId10"/>
-    <p:sldId id="329" r:id="rId11"/>
+    <p:sldId id="341" r:id="rId8"/>
+    <p:sldId id="343" r:id="rId9"/>
+    <p:sldId id="344" r:id="rId10"/>
+    <p:sldId id="342" r:id="rId11"/>
+    <p:sldId id="339" r:id="rId12"/>
+    <p:sldId id="333" r:id="rId13"/>
+    <p:sldId id="328" r:id="rId14"/>
+    <p:sldId id="329" r:id="rId15"/>
   </p:sldIdLst>
   <p:sldSz cx="9144000" cy="6858000" type="screen4x3"/>
   <p:notesSz cx="6858000" cy="9144000"/>
@@ -1186,6 +1190,314 @@
 </p:notes>
 </file>
 
+<file path=ppt/notesSlides/notesSlide10.xml><?xml version="1.0" encoding="utf-8"?>
+<p:notes xmlns:a="http://schemas.openxmlformats.org/drawingml/2006/main" xmlns:r="http://schemas.openxmlformats.org/officeDocument/2006/relationships" xmlns:p="http://schemas.openxmlformats.org/presentationml/2006/main">
+  <p:cSld>
+    <p:spTree>
+      <p:nvGrpSpPr>
+        <p:cNvPr id="1" name=""/>
+        <p:cNvGrpSpPr/>
+        <p:nvPr/>
+      </p:nvGrpSpPr>
+      <p:grpSpPr>
+        <a:xfrm>
+          <a:off x="0" y="0"/>
+          <a:ext cx="0" cy="0"/>
+          <a:chOff x="0" y="0"/>
+          <a:chExt cx="0" cy="0"/>
+        </a:xfrm>
+      </p:grpSpPr>
+      <p:sp>
+        <p:nvSpPr>
+          <p:cNvPr id="2" name="Slide Image Placeholder 1"/>
+          <p:cNvSpPr>
+            <a:spLocks noGrp="1" noRot="1" noChangeAspect="1"/>
+          </p:cNvSpPr>
+          <p:nvPr>
+            <p:ph type="sldImg"/>
+          </p:nvPr>
+        </p:nvSpPr>
+        <p:spPr/>
+      </p:sp>
+      <p:sp>
+        <p:nvSpPr>
+          <p:cNvPr id="3" name="Notes Placeholder 2"/>
+          <p:cNvSpPr>
+            <a:spLocks noGrp="1"/>
+          </p:cNvSpPr>
+          <p:nvPr>
+            <p:ph type="body" idx="1"/>
+          </p:nvPr>
+        </p:nvSpPr>
+        <p:spPr/>
+        <p:txBody>
+          <a:bodyPr/>
+          <a:lstStyle/>
+          <a:p>
+            <a:r>
+              <a:rPr lang="en-US" dirty="0" smtClean="0"/>
+              <a:t>Define buttons separately prior</a:t>
+            </a:r>
+          </a:p>
+          <a:p>
+            <a:r>
+              <a:rPr lang="en-US" dirty="0" smtClean="0"/>
+              <a:t>Assign object</a:t>
+            </a:r>
+            <a:r>
+              <a:rPr lang="en-US" baseline="0" dirty="0" smtClean="0"/>
+              <a:t> references to </a:t>
+            </a:r>
+            <a:r>
+              <a:rPr lang="en-US" baseline="0" dirty="0" err="1" smtClean="0"/>
+              <a:t>keyboardToolbar</a:t>
+            </a:r>
+            <a:r>
+              <a:rPr lang="en-US" baseline="0" dirty="0" smtClean="0"/>
+              <a:t> property</a:t>
+            </a:r>
+          </a:p>
+          <a:p>
+            <a:r>
+              <a:rPr lang="en-US" baseline="0" dirty="0" smtClean="0"/>
+              <a:t>Add event listeners to those individual buttons</a:t>
+            </a:r>
+            <a:endParaRPr lang="en-US" dirty="0"/>
+          </a:p>
+        </p:txBody>
+      </p:sp>
+      <p:sp>
+        <p:nvSpPr>
+          <p:cNvPr id="4" name="Slide Number Placeholder 3"/>
+          <p:cNvSpPr>
+            <a:spLocks noGrp="1"/>
+          </p:cNvSpPr>
+          <p:nvPr>
+            <p:ph type="sldNum" sz="quarter" idx="10"/>
+          </p:nvPr>
+        </p:nvSpPr>
+        <p:spPr/>
+        <p:txBody>
+          <a:bodyPr/>
+          <a:lstStyle/>
+          <a:p>
+            <a:pPr>
+              <a:defRPr/>
+            </a:pPr>
+            <a:fld id="{C704D923-8FB6-2040-A5D7-BD75ED8E8368}" type="slidenum">
+              <a:rPr lang="en-US" smtClean="0"/>
+              <a:pPr>
+                <a:defRPr/>
+              </a:pPr>
+              <a:t>10</a:t>
+            </a:fld>
+            <a:endParaRPr lang="en-US"/>
+          </a:p>
+        </p:txBody>
+      </p:sp>
+    </p:spTree>
+    <p:extLst>
+      <p:ext uri="{BB962C8B-B14F-4D97-AF65-F5344CB8AC3E}">
+        <p14:creationId xmlns:p14="http://schemas.microsoft.com/office/powerpoint/2010/main" val="3273908932"/>
+      </p:ext>
+    </p:extLst>
+  </p:cSld>
+  <p:clrMapOvr>
+    <a:masterClrMapping/>
+  </p:clrMapOvr>
+</p:notes>
+</file>
+
+<file path=ppt/notesSlides/notesSlide11.xml><?xml version="1.0" encoding="utf-8"?>
+<p:notes xmlns:a="http://schemas.openxmlformats.org/drawingml/2006/main" xmlns:r="http://schemas.openxmlformats.org/officeDocument/2006/relationships" xmlns:p="http://schemas.openxmlformats.org/presentationml/2006/main">
+  <p:cSld>
+    <p:spTree>
+      <p:nvGrpSpPr>
+        <p:cNvPr id="1" name=""/>
+        <p:cNvGrpSpPr/>
+        <p:nvPr/>
+      </p:nvGrpSpPr>
+      <p:grpSpPr>
+        <a:xfrm>
+          <a:off x="0" y="0"/>
+          <a:ext cx="0" cy="0"/>
+          <a:chOff x="0" y="0"/>
+          <a:chExt cx="0" cy="0"/>
+        </a:xfrm>
+      </p:grpSpPr>
+      <p:sp>
+        <p:nvSpPr>
+          <p:cNvPr id="2" name="Slide Image Placeholder 1"/>
+          <p:cNvSpPr>
+            <a:spLocks noGrp="1" noRot="1" noChangeAspect="1"/>
+          </p:cNvSpPr>
+          <p:nvPr>
+            <p:ph type="sldImg"/>
+          </p:nvPr>
+        </p:nvSpPr>
+        <p:spPr/>
+      </p:sp>
+      <p:sp>
+        <p:nvSpPr>
+          <p:cNvPr id="3" name="Notes Placeholder 2"/>
+          <p:cNvSpPr>
+            <a:spLocks noGrp="1"/>
+          </p:cNvSpPr>
+          <p:nvPr>
+            <p:ph type="body" idx="1"/>
+          </p:nvPr>
+        </p:nvSpPr>
+        <p:spPr/>
+        <p:txBody>
+          <a:bodyPr/>
+          <a:lstStyle/>
+          <a:p>
+            <a:endParaRPr lang="en-US" dirty="0"/>
+          </a:p>
+        </p:txBody>
+      </p:sp>
+      <p:sp>
+        <p:nvSpPr>
+          <p:cNvPr id="4" name="Slide Number Placeholder 3"/>
+          <p:cNvSpPr>
+            <a:spLocks noGrp="1"/>
+          </p:cNvSpPr>
+          <p:nvPr>
+            <p:ph type="sldNum" sz="quarter" idx="10"/>
+          </p:nvPr>
+        </p:nvSpPr>
+        <p:spPr/>
+        <p:txBody>
+          <a:bodyPr/>
+          <a:lstStyle/>
+          <a:p>
+            <a:pPr>
+              <a:defRPr/>
+            </a:pPr>
+            <a:fld id="{C704D923-8FB6-2040-A5D7-BD75ED8E8368}" type="slidenum">
+              <a:rPr lang="en-US" smtClean="0"/>
+              <a:pPr>
+                <a:defRPr/>
+              </a:pPr>
+              <a:t>11</a:t>
+            </a:fld>
+            <a:endParaRPr lang="en-US"/>
+          </a:p>
+        </p:txBody>
+      </p:sp>
+    </p:spTree>
+    <p:extLst>
+      <p:ext uri="{BB962C8B-B14F-4D97-AF65-F5344CB8AC3E}">
+        <p14:creationId xmlns:p14="http://schemas.microsoft.com/office/powerpoint/2010/main" val="3273908932"/>
+      </p:ext>
+    </p:extLst>
+  </p:cSld>
+  <p:clrMapOvr>
+    <a:masterClrMapping/>
+  </p:clrMapOvr>
+</p:notes>
+</file>
+
+<file path=ppt/notesSlides/notesSlide12.xml><?xml version="1.0" encoding="utf-8"?>
+<p:notes xmlns:a="http://schemas.openxmlformats.org/drawingml/2006/main" xmlns:r="http://schemas.openxmlformats.org/officeDocument/2006/relationships" xmlns:p="http://schemas.openxmlformats.org/presentationml/2006/main">
+  <p:cSld>
+    <p:spTree>
+      <p:nvGrpSpPr>
+        <p:cNvPr id="1" name=""/>
+        <p:cNvGrpSpPr/>
+        <p:nvPr/>
+      </p:nvGrpSpPr>
+      <p:grpSpPr>
+        <a:xfrm>
+          <a:off x="0" y="0"/>
+          <a:ext cx="0" cy="0"/>
+          <a:chOff x="0" y="0"/>
+          <a:chExt cx="0" cy="0"/>
+        </a:xfrm>
+      </p:grpSpPr>
+      <p:sp>
+        <p:nvSpPr>
+          <p:cNvPr id="2" name="Slide Image Placeholder 1"/>
+          <p:cNvSpPr>
+            <a:spLocks noGrp="1" noRot="1" noChangeAspect="1"/>
+          </p:cNvSpPr>
+          <p:nvPr>
+            <p:ph type="sldImg"/>
+          </p:nvPr>
+        </p:nvSpPr>
+        <p:spPr/>
+      </p:sp>
+      <p:sp>
+        <p:nvSpPr>
+          <p:cNvPr id="3" name="Notes Placeholder 2"/>
+          <p:cNvSpPr>
+            <a:spLocks noGrp="1"/>
+          </p:cNvSpPr>
+          <p:nvPr>
+            <p:ph type="body" idx="1"/>
+          </p:nvPr>
+        </p:nvSpPr>
+        <p:spPr/>
+        <p:txBody>
+          <a:bodyPr/>
+          <a:lstStyle/>
+          <a:p>
+            <a:r>
+              <a:rPr lang="en-US" b="1" dirty="0" smtClean="0"/>
+              <a:t>Goals: </a:t>
+            </a:r>
+          </a:p>
+          <a:p>
+            <a:r>
+              <a:rPr lang="en-US" baseline="0" dirty="0" smtClean="0"/>
+              <a:t>do something</a:t>
+            </a:r>
+            <a:endParaRPr lang="en-US" baseline="0" dirty="0" smtClean="0"/>
+          </a:p>
+        </p:txBody>
+      </p:sp>
+      <p:sp>
+        <p:nvSpPr>
+          <p:cNvPr id="4" name="Slide Number Placeholder 3"/>
+          <p:cNvSpPr>
+            <a:spLocks noGrp="1"/>
+          </p:cNvSpPr>
+          <p:nvPr>
+            <p:ph type="sldNum" sz="quarter" idx="10"/>
+          </p:nvPr>
+        </p:nvSpPr>
+        <p:spPr/>
+        <p:txBody>
+          <a:bodyPr/>
+          <a:lstStyle/>
+          <a:p>
+            <a:pPr>
+              <a:defRPr/>
+            </a:pPr>
+            <a:fld id="{C704D923-8FB6-2040-A5D7-BD75ED8E8368}" type="slidenum">
+              <a:rPr lang="en-US" smtClean="0"/>
+              <a:pPr>
+                <a:defRPr/>
+              </a:pPr>
+              <a:t>13</a:t>
+            </a:fld>
+            <a:endParaRPr lang="en-US"/>
+          </a:p>
+        </p:txBody>
+      </p:sp>
+    </p:spTree>
+    <p:extLst>
+      <p:ext uri="{BB962C8B-B14F-4D97-AF65-F5344CB8AC3E}">
+        <p14:creationId xmlns:p14="http://schemas.microsoft.com/office/powerpoint/2010/main" val="1705129735"/>
+      </p:ext>
+    </p:extLst>
+  </p:cSld>
+  <p:clrMapOvr>
+    <a:masterClrMapping/>
+  </p:clrMapOvr>
+</p:notes>
+</file>
+
 <file path=ppt/notesSlides/notesSlide2.xml><?xml version="1.0" encoding="utf-8"?>
 <p:notes xmlns:a="http://schemas.openxmlformats.org/drawingml/2006/main" xmlns:r="http://schemas.openxmlformats.org/officeDocument/2006/relationships" xmlns:p="http://schemas.openxmlformats.org/presentationml/2006/main">
   <p:cSld>
@@ -2721,6 +3033,20 @@
           <a:bodyPr/>
           <a:lstStyle/>
           <a:p>
+            <a:r>
+              <a:rPr lang="en-US" dirty="0" smtClean="0"/>
+              <a:t>Agenda</a:t>
+            </a:r>
+            <a:r>
+              <a:rPr lang="en-US" baseline="0" dirty="0" smtClean="0"/>
+              <a:t> type slide</a:t>
+            </a:r>
+          </a:p>
+          <a:p>
+            <a:r>
+              <a:rPr lang="en-US" baseline="0" dirty="0" smtClean="0"/>
+              <a:t>Details on upcoming slides</a:t>
+            </a:r>
             <a:endParaRPr lang="en-US" dirty="0"/>
           </a:p>
         </p:txBody>
@@ -2811,6 +3137,23 @@
           <a:bodyPr/>
           <a:lstStyle/>
           <a:p>
+            <a:r>
+              <a:rPr lang="en-US" dirty="0" smtClean="0"/>
+              <a:t>Keyboard types</a:t>
+            </a:r>
+          </a:p>
+          <a:p>
+            <a:endParaRPr lang="en-US" dirty="0" smtClean="0"/>
+          </a:p>
+          <a:p>
+            <a:r>
+              <a:rPr lang="en-US" dirty="0" smtClean="0"/>
+              <a:t>Set on text field or text area with </a:t>
+            </a:r>
+            <a:r>
+              <a:rPr lang="en-US" dirty="0" err="1" smtClean="0"/>
+              <a:t>Ti.UI.type_name</a:t>
+            </a:r>
             <a:endParaRPr lang="en-US" dirty="0"/>
           </a:p>
         </p:txBody>
@@ -2902,16 +3245,49 @@
           <a:lstStyle/>
           <a:p>
             <a:r>
-              <a:rPr lang="en-US" b="1" dirty="0" smtClean="0"/>
-              <a:t>Goals: </a:t>
-            </a:r>
-          </a:p>
-          <a:p>
+              <a:rPr lang="en-US" dirty="0" smtClean="0"/>
+              <a:t>Differences are subtle</a:t>
+            </a:r>
+          </a:p>
+          <a:p>
+            <a:r>
+              <a:rPr lang="en-US" dirty="0" err="1" smtClean="0"/>
+              <a:t>Numbers_Punctuation</a:t>
+            </a:r>
             <a:r>
               <a:rPr lang="en-US" baseline="0" dirty="0" smtClean="0"/>
-              <a:t>do something</a:t>
-            </a:r>
+              <a:t> and </a:t>
+            </a:r>
+            <a:r>
+              <a:rPr lang="en-US" baseline="0" dirty="0" err="1" smtClean="0"/>
+              <a:t>Namephone_Pad</a:t>
+            </a:r>
+            <a:r>
+              <a:rPr lang="en-US" baseline="0" dirty="0" smtClean="0"/>
+              <a:t> are the same</a:t>
+            </a:r>
+          </a:p>
+          <a:p>
+            <a:r>
+              <a:rPr lang="en-US" baseline="0" dirty="0" err="1" smtClean="0"/>
+              <a:t>Decimal_Pad</a:t>
+            </a:r>
+            <a:r>
+              <a:rPr lang="en-US" baseline="0" dirty="0" smtClean="0"/>
+              <a:t> not supported</a:t>
+            </a:r>
+          </a:p>
+          <a:p>
             <a:endParaRPr lang="en-US" baseline="0" dirty="0" smtClean="0"/>
+          </a:p>
+          <a:p>
+            <a:r>
+              <a:rPr lang="en-US" baseline="0" dirty="0" smtClean="0"/>
+              <a:t>Carrier themes will likely change the appearance of these</a:t>
+            </a:r>
+          </a:p>
+          <a:p>
+            <a:endParaRPr lang="en-US" dirty="0"/>
           </a:p>
         </p:txBody>
       </p:sp>
@@ -2938,7 +3314,7 @@
               <a:pPr>
                 <a:defRPr/>
               </a:pPr>
-              <a:t>9</a:t>
+              <a:t>8</a:t>
             </a:fld>
             <a:endParaRPr lang="en-US"/>
           </a:p>
@@ -2947,7 +3323,126 @@
     </p:spTree>
     <p:extLst>
       <p:ext uri="{BB962C8B-B14F-4D97-AF65-F5344CB8AC3E}">
-        <p14:creationId xmlns:p14="http://schemas.microsoft.com/office/powerpoint/2010/main" val="1705129735"/>
+        <p14:creationId xmlns:p14="http://schemas.microsoft.com/office/powerpoint/2010/main" val="3273908932"/>
+      </p:ext>
+    </p:extLst>
+  </p:cSld>
+  <p:clrMapOvr>
+    <a:masterClrMapping/>
+  </p:clrMapOvr>
+</p:notes>
+</file>
+
+<file path=ppt/notesSlides/notesSlide9.xml><?xml version="1.0" encoding="utf-8"?>
+<p:notes xmlns:a="http://schemas.openxmlformats.org/drawingml/2006/main" xmlns:r="http://schemas.openxmlformats.org/officeDocument/2006/relationships" xmlns:p="http://schemas.openxmlformats.org/presentationml/2006/main">
+  <p:cSld>
+    <p:spTree>
+      <p:nvGrpSpPr>
+        <p:cNvPr id="1" name=""/>
+        <p:cNvGrpSpPr/>
+        <p:nvPr/>
+      </p:nvGrpSpPr>
+      <p:grpSpPr>
+        <a:xfrm>
+          <a:off x="0" y="0"/>
+          <a:ext cx="0" cy="0"/>
+          <a:chOff x="0" y="0"/>
+          <a:chExt cx="0" cy="0"/>
+        </a:xfrm>
+      </p:grpSpPr>
+      <p:sp>
+        <p:nvSpPr>
+          <p:cNvPr id="2" name="Slide Image Placeholder 1"/>
+          <p:cNvSpPr>
+            <a:spLocks noGrp="1" noRot="1" noChangeAspect="1"/>
+          </p:cNvSpPr>
+          <p:nvPr>
+            <p:ph type="sldImg"/>
+          </p:nvPr>
+        </p:nvSpPr>
+        <p:spPr/>
+      </p:sp>
+      <p:sp>
+        <p:nvSpPr>
+          <p:cNvPr id="3" name="Notes Placeholder 2"/>
+          <p:cNvSpPr>
+            <a:spLocks noGrp="1"/>
+          </p:cNvSpPr>
+          <p:nvPr>
+            <p:ph type="body" idx="1"/>
+          </p:nvPr>
+        </p:nvSpPr>
+        <p:spPr/>
+        <p:txBody>
+          <a:bodyPr/>
+          <a:lstStyle/>
+          <a:p>
+            <a:r>
+              <a:rPr lang="en-US" dirty="0" smtClean="0"/>
+              <a:t>Return</a:t>
+            </a:r>
+            <a:r>
+              <a:rPr lang="en-US" baseline="0" dirty="0" smtClean="0"/>
+              <a:t> key options</a:t>
+            </a:r>
+          </a:p>
+          <a:p>
+            <a:r>
+              <a:rPr lang="en-US" baseline="0" dirty="0" smtClean="0"/>
+              <a:t>Changes label and user expectation</a:t>
+            </a:r>
+          </a:p>
+          <a:p>
+            <a:r>
+              <a:rPr lang="en-US" baseline="0" dirty="0" smtClean="0"/>
+              <a:t>When button is tapped, the return event of the input field is fired</a:t>
+            </a:r>
+          </a:p>
+          <a:p>
+            <a:endParaRPr lang="en-US" baseline="0" dirty="0" smtClean="0"/>
+          </a:p>
+          <a:p>
+            <a:r>
+              <a:rPr lang="en-US" baseline="0" dirty="0" smtClean="0"/>
+              <a:t>Hint: you could capture return event and move focus to next field in a long form</a:t>
+            </a:r>
+            <a:endParaRPr lang="en-US" dirty="0"/>
+          </a:p>
+        </p:txBody>
+      </p:sp>
+      <p:sp>
+        <p:nvSpPr>
+          <p:cNvPr id="4" name="Slide Number Placeholder 3"/>
+          <p:cNvSpPr>
+            <a:spLocks noGrp="1"/>
+          </p:cNvSpPr>
+          <p:nvPr>
+            <p:ph type="sldNum" sz="quarter" idx="10"/>
+          </p:nvPr>
+        </p:nvSpPr>
+        <p:spPr/>
+        <p:txBody>
+          <a:bodyPr/>
+          <a:lstStyle/>
+          <a:p>
+            <a:pPr>
+              <a:defRPr/>
+            </a:pPr>
+            <a:fld id="{C704D923-8FB6-2040-A5D7-BD75ED8E8368}" type="slidenum">
+              <a:rPr lang="en-US" smtClean="0"/>
+              <a:pPr>
+                <a:defRPr/>
+              </a:pPr>
+              <a:t>9</a:t>
+            </a:fld>
+            <a:endParaRPr lang="en-US"/>
+          </a:p>
+        </p:txBody>
+      </p:sp>
+    </p:spTree>
+    <p:extLst>
+      <p:ext uri="{BB962C8B-B14F-4D97-AF65-F5344CB8AC3E}">
+        <p14:creationId xmlns:p14="http://schemas.microsoft.com/office/powerpoint/2010/main" val="3273908932"/>
       </p:ext>
     </p:extLst>
   </p:cSld>
@@ -6765,6 +7260,825 @@
 </file>
 
 <file path=ppt/slides/slide10.xml><?xml version="1.0" encoding="utf-8"?>
+<p:sld xmlns:a="http://schemas.openxmlformats.org/drawingml/2006/main" xmlns:r="http://schemas.openxmlformats.org/officeDocument/2006/relationships" xmlns:p="http://schemas.openxmlformats.org/presentationml/2006/main">
+  <p:cSld>
+    <p:spTree>
+      <p:nvGrpSpPr>
+        <p:cNvPr id="1" name=""/>
+        <p:cNvGrpSpPr/>
+        <p:nvPr/>
+      </p:nvGrpSpPr>
+      <p:grpSpPr>
+        <a:xfrm>
+          <a:off x="0" y="0"/>
+          <a:ext cx="0" cy="0"/>
+          <a:chOff x="0" y="0"/>
+          <a:chExt cx="0" cy="0"/>
+        </a:xfrm>
+      </p:grpSpPr>
+      <p:sp>
+        <p:nvSpPr>
+          <p:cNvPr id="2" name="Title 1"/>
+          <p:cNvSpPr>
+            <a:spLocks noGrp="1"/>
+          </p:cNvSpPr>
+          <p:nvPr>
+            <p:ph type="title"/>
+          </p:nvPr>
+        </p:nvSpPr>
+        <p:spPr/>
+        <p:txBody>
+          <a:bodyPr/>
+          <a:lstStyle/>
+          <a:p>
+            <a:r>
+              <a:rPr lang="en-US" dirty="0" smtClean="0"/>
+              <a:t>Keyboard Toolbars</a:t>
+            </a:r>
+            <a:endParaRPr lang="en-US" dirty="0"/>
+          </a:p>
+        </p:txBody>
+      </p:sp>
+      <p:sp>
+        <p:nvSpPr>
+          <p:cNvPr id="3" name="Content Placeholder 2"/>
+          <p:cNvSpPr>
+            <a:spLocks noGrp="1"/>
+          </p:cNvSpPr>
+          <p:nvPr>
+            <p:ph idx="1"/>
+          </p:nvPr>
+        </p:nvSpPr>
+        <p:spPr/>
+        <p:txBody>
+          <a:bodyPr/>
+          <a:lstStyle/>
+          <a:p>
+            <a:r>
+              <a:rPr lang="en-US" dirty="0" err="1" smtClean="0"/>
+              <a:t>iOS</a:t>
+            </a:r>
+            <a:r>
+              <a:rPr lang="en-US" dirty="0" smtClean="0"/>
+              <a:t> only feature</a:t>
+            </a:r>
+            <a:endParaRPr lang="en-US" dirty="0" smtClean="0"/>
+          </a:p>
+        </p:txBody>
+      </p:sp>
+      <p:pic>
+        <p:nvPicPr>
+          <p:cNvPr id="4" name="Picture 3" descr="Screenshot_29.png"/>
+          <p:cNvPicPr>
+            <a:picLocks noChangeAspect="1"/>
+          </p:cNvPicPr>
+          <p:nvPr/>
+        </p:nvPicPr>
+        <p:blipFill>
+          <a:blip r:embed="rId3">
+            <a:extLst>
+              <a:ext uri="{28A0092B-C50C-407E-A947-70E740481C1C}">
+                <a14:useLocalDpi xmlns:a14="http://schemas.microsoft.com/office/drawing/2010/main" val="0"/>
+              </a:ext>
+            </a:extLst>
+          </a:blip>
+          <a:stretch>
+            <a:fillRect/>
+          </a:stretch>
+        </p:blipFill>
+        <p:spPr>
+          <a:xfrm>
+            <a:off x="5992744" y="1898650"/>
+            <a:ext cx="2641600" cy="3797300"/>
+          </a:xfrm>
+          <a:prstGeom prst="rect">
+            <a:avLst/>
+          </a:prstGeom>
+          <a:ln>
+            <a:noFill/>
+          </a:ln>
+          <a:effectLst>
+            <a:outerShdw blurRad="292100" dist="139700" dir="2700000" algn="tl" rotWithShape="0">
+              <a:srgbClr val="333333">
+                <a:alpha val="65000"/>
+              </a:srgbClr>
+            </a:outerShdw>
+          </a:effectLst>
+        </p:spPr>
+      </p:pic>
+      <p:sp>
+        <p:nvSpPr>
+          <p:cNvPr id="5" name="TextBox 4"/>
+          <p:cNvSpPr txBox="1"/>
+          <p:nvPr/>
+        </p:nvSpPr>
+        <p:spPr>
+          <a:xfrm>
+            <a:off x="503766" y="2101500"/>
+            <a:ext cx="5281489" cy="3446072"/>
+          </a:xfrm>
+          <a:prstGeom prst="rect">
+            <a:avLst/>
+          </a:prstGeom>
+          <a:solidFill>
+            <a:schemeClr val="bg1"/>
+          </a:solidFill>
+          <a:ln w="12700">
+            <a:solidFill>
+              <a:schemeClr val="accent2"/>
+            </a:solidFill>
+          </a:ln>
+          <a:effectLst>
+            <a:outerShdw blurRad="50800" dist="38100" dir="2700000" algn="tl" rotWithShape="0">
+              <a:srgbClr val="000000">
+                <a:alpha val="43000"/>
+              </a:srgbClr>
+            </a:outerShdw>
+          </a:effectLst>
+        </p:spPr>
+        <p:txBody>
+          <a:bodyPr wrap="none" rtlCol="0">
+            <a:spAutoFit/>
+          </a:bodyPr>
+          <a:lstStyle/>
+          <a:p>
+            <a:pPr>
+              <a:lnSpc>
+                <a:spcPct val="120000"/>
+              </a:lnSpc>
+            </a:pPr>
+            <a:r>
+              <a:rPr lang="en-US" sz="1400" dirty="0" err="1">
+                <a:solidFill>
+                  <a:srgbClr val="122956"/>
+                </a:solidFill>
+              </a:rPr>
+              <a:t>var</a:t>
+            </a:r>
+            <a:r>
+              <a:rPr lang="en-US" sz="1400" dirty="0">
+                <a:solidFill>
+                  <a:srgbClr val="122956"/>
+                </a:solidFill>
+              </a:rPr>
+              <a:t> </a:t>
+            </a:r>
+            <a:r>
+              <a:rPr lang="en-US" sz="1400" dirty="0" err="1">
+                <a:solidFill>
+                  <a:srgbClr val="122956"/>
+                </a:solidFill>
+              </a:rPr>
+              <a:t>textfield</a:t>
+            </a:r>
+            <a:r>
+              <a:rPr lang="en-US" sz="1400" dirty="0">
+                <a:solidFill>
+                  <a:srgbClr val="122956"/>
+                </a:solidFill>
+              </a:rPr>
+              <a:t> = </a:t>
+            </a:r>
+            <a:r>
+              <a:rPr lang="en-US" sz="1400" dirty="0" err="1">
+                <a:solidFill>
+                  <a:srgbClr val="122956"/>
+                </a:solidFill>
+              </a:rPr>
+              <a:t>Titanium.UI.createTextField</a:t>
+            </a:r>
+            <a:r>
+              <a:rPr lang="en-US" sz="1400" dirty="0">
+                <a:solidFill>
+                  <a:srgbClr val="122956"/>
+                </a:solidFill>
+              </a:rPr>
+              <a:t>({</a:t>
+            </a:r>
+          </a:p>
+          <a:p>
+            <a:pPr>
+              <a:lnSpc>
+                <a:spcPct val="120000"/>
+              </a:lnSpc>
+            </a:pPr>
+            <a:r>
+              <a:rPr lang="en-US" sz="1400" dirty="0">
+                <a:solidFill>
+                  <a:srgbClr val="122956"/>
+                </a:solidFill>
+              </a:rPr>
+              <a:t>	color:'#336699',</a:t>
+            </a:r>
+          </a:p>
+          <a:p>
+            <a:pPr>
+              <a:lnSpc>
+                <a:spcPct val="120000"/>
+              </a:lnSpc>
+            </a:pPr>
+            <a:r>
+              <a:rPr lang="en-US" sz="1400" dirty="0">
+                <a:solidFill>
+                  <a:srgbClr val="122956"/>
+                </a:solidFill>
+              </a:rPr>
+              <a:t>	</a:t>
+            </a:r>
+            <a:r>
+              <a:rPr lang="en-US" sz="1400" dirty="0" err="1">
+                <a:solidFill>
+                  <a:srgbClr val="122956"/>
+                </a:solidFill>
+              </a:rPr>
+              <a:t>value:'Focus</a:t>
+            </a:r>
+            <a:r>
+              <a:rPr lang="en-US" sz="1400" dirty="0">
+                <a:solidFill>
+                  <a:srgbClr val="122956"/>
+                </a:solidFill>
+              </a:rPr>
+              <a:t> to see keyboard w/ toolbar',</a:t>
+            </a:r>
+          </a:p>
+          <a:p>
+            <a:pPr>
+              <a:lnSpc>
+                <a:spcPct val="120000"/>
+              </a:lnSpc>
+            </a:pPr>
+            <a:r>
+              <a:rPr lang="en-US" sz="1400" dirty="0">
+                <a:solidFill>
+                  <a:srgbClr val="122956"/>
+                </a:solidFill>
+              </a:rPr>
+              <a:t>	height:35,</a:t>
+            </a:r>
+          </a:p>
+          <a:p>
+            <a:pPr>
+              <a:lnSpc>
+                <a:spcPct val="120000"/>
+              </a:lnSpc>
+            </a:pPr>
+            <a:r>
+              <a:rPr lang="en-US" sz="1400" dirty="0">
+                <a:solidFill>
+                  <a:srgbClr val="122956"/>
+                </a:solidFill>
+              </a:rPr>
+              <a:t>	width:300,</a:t>
+            </a:r>
+          </a:p>
+          <a:p>
+            <a:pPr>
+              <a:lnSpc>
+                <a:spcPct val="120000"/>
+              </a:lnSpc>
+            </a:pPr>
+            <a:r>
+              <a:rPr lang="en-US" sz="1400" dirty="0">
+                <a:solidFill>
+                  <a:srgbClr val="122956"/>
+                </a:solidFill>
+              </a:rPr>
+              <a:t>	top:10,</a:t>
+            </a:r>
+          </a:p>
+          <a:p>
+            <a:pPr>
+              <a:lnSpc>
+                <a:spcPct val="120000"/>
+              </a:lnSpc>
+            </a:pPr>
+            <a:r>
+              <a:rPr lang="en-US" sz="1400" dirty="0">
+                <a:solidFill>
+                  <a:srgbClr val="122956"/>
+                </a:solidFill>
+              </a:rPr>
+              <a:t>	</a:t>
+            </a:r>
+            <a:r>
+              <a:rPr lang="en-US" sz="1400" dirty="0" err="1">
+                <a:solidFill>
+                  <a:srgbClr val="122956"/>
+                </a:solidFill>
+              </a:rPr>
+              <a:t>borderStyle:Titanium.UI.INPUT_BORDERSTYLE_ROUNDED</a:t>
+            </a:r>
+            <a:r>
+              <a:rPr lang="en-US" sz="1400" dirty="0">
+                <a:solidFill>
+                  <a:srgbClr val="122956"/>
+                </a:solidFill>
+              </a:rPr>
+              <a:t>,</a:t>
+            </a:r>
+          </a:p>
+          <a:p>
+            <a:pPr>
+              <a:lnSpc>
+                <a:spcPct val="120000"/>
+              </a:lnSpc>
+            </a:pPr>
+            <a:r>
+              <a:rPr lang="en-US" sz="1400" dirty="0">
+                <a:solidFill>
+                  <a:srgbClr val="122956"/>
+                </a:solidFill>
+              </a:rPr>
+              <a:t>	</a:t>
+            </a:r>
+            <a:r>
+              <a:rPr lang="en-US" sz="1400" b="1" dirty="0" err="1">
+                <a:solidFill>
+                  <a:srgbClr val="122956"/>
+                </a:solidFill>
+              </a:rPr>
+              <a:t>keyboardToolbar</a:t>
+            </a:r>
+            <a:r>
+              <a:rPr lang="en-US" sz="1400" b="1" dirty="0">
+                <a:solidFill>
+                  <a:srgbClr val="122956"/>
+                </a:solidFill>
+              </a:rPr>
+              <a:t>:[</a:t>
+            </a:r>
+            <a:r>
+              <a:rPr lang="en-US" sz="1400" b="1" dirty="0" err="1">
+                <a:solidFill>
+                  <a:srgbClr val="122956"/>
+                </a:solidFill>
+              </a:rPr>
+              <a:t>flexSpace,camera</a:t>
+            </a:r>
+            <a:r>
+              <a:rPr lang="en-US" sz="1400" b="1" dirty="0">
+                <a:solidFill>
+                  <a:srgbClr val="122956"/>
+                </a:solidFill>
+              </a:rPr>
+              <a:t>, </a:t>
+            </a:r>
+            <a:r>
+              <a:rPr lang="en-US" sz="1400" b="1" dirty="0" err="1">
+                <a:solidFill>
+                  <a:srgbClr val="122956"/>
+                </a:solidFill>
+              </a:rPr>
+              <a:t>flexSpace</a:t>
+            </a:r>
+            <a:r>
+              <a:rPr lang="en-US" sz="1400" b="1" dirty="0" smtClean="0">
+                <a:solidFill>
+                  <a:srgbClr val="122956"/>
+                </a:solidFill>
+              </a:rPr>
+              <a:t>, </a:t>
+            </a:r>
+            <a:r>
+              <a:rPr lang="en-US" sz="1400" b="1" dirty="0" err="1" smtClean="0">
+                <a:solidFill>
+                  <a:srgbClr val="122956"/>
+                </a:solidFill>
+              </a:rPr>
+              <a:t>tf</a:t>
+            </a:r>
+            <a:r>
+              <a:rPr lang="en-US" sz="1400" b="1" dirty="0" smtClean="0">
+                <a:solidFill>
+                  <a:srgbClr val="122956"/>
+                </a:solidFill>
+              </a:rPr>
+              <a:t>,</a:t>
+            </a:r>
+          </a:p>
+          <a:p>
+            <a:pPr>
+              <a:lnSpc>
+                <a:spcPct val="120000"/>
+              </a:lnSpc>
+            </a:pPr>
+            <a:r>
+              <a:rPr lang="en-US" sz="1400" b="1" dirty="0">
+                <a:solidFill>
+                  <a:srgbClr val="122956"/>
+                </a:solidFill>
+              </a:rPr>
+              <a:t> </a:t>
+            </a:r>
+            <a:r>
+              <a:rPr lang="en-US" sz="1400" b="1" dirty="0" smtClean="0">
+                <a:solidFill>
+                  <a:srgbClr val="122956"/>
+                </a:solidFill>
+              </a:rPr>
+              <a:t>                  </a:t>
+            </a:r>
+            <a:r>
+              <a:rPr lang="en-US" sz="1400" b="1" dirty="0" err="1" smtClean="0">
+                <a:solidFill>
+                  <a:srgbClr val="122956"/>
+                </a:solidFill>
+              </a:rPr>
+              <a:t>flexSpace</a:t>
+            </a:r>
+            <a:r>
+              <a:rPr lang="en-US" sz="1400" b="1" dirty="0">
+                <a:solidFill>
+                  <a:srgbClr val="122956"/>
+                </a:solidFill>
+              </a:rPr>
+              <a:t>, </a:t>
+            </a:r>
+            <a:r>
+              <a:rPr lang="en-US" sz="1400" b="1" dirty="0" err="1">
+                <a:solidFill>
+                  <a:srgbClr val="122956"/>
+                </a:solidFill>
+              </a:rPr>
+              <a:t>send,flexSpace</a:t>
+            </a:r>
+            <a:r>
+              <a:rPr lang="en-US" sz="1400" b="1" dirty="0">
+                <a:solidFill>
+                  <a:srgbClr val="122956"/>
+                </a:solidFill>
+              </a:rPr>
+              <a:t>],</a:t>
+            </a:r>
+          </a:p>
+          <a:p>
+            <a:pPr>
+              <a:lnSpc>
+                <a:spcPct val="120000"/>
+              </a:lnSpc>
+            </a:pPr>
+            <a:r>
+              <a:rPr lang="en-US" sz="1400" b="1" dirty="0">
+                <a:solidFill>
+                  <a:srgbClr val="122956"/>
+                </a:solidFill>
+              </a:rPr>
+              <a:t>	</a:t>
+            </a:r>
+            <a:r>
+              <a:rPr lang="en-US" sz="1400" b="1" dirty="0" err="1">
+                <a:solidFill>
+                  <a:srgbClr val="122956"/>
+                </a:solidFill>
+              </a:rPr>
+              <a:t>keyboardToolbarColor</a:t>
+            </a:r>
+            <a:r>
+              <a:rPr lang="en-US" sz="1400" b="1" dirty="0">
+                <a:solidFill>
+                  <a:srgbClr val="122956"/>
+                </a:solidFill>
+              </a:rPr>
+              <a:t>: '#999',	</a:t>
+            </a:r>
+          </a:p>
+          <a:p>
+            <a:pPr>
+              <a:lnSpc>
+                <a:spcPct val="120000"/>
+              </a:lnSpc>
+            </a:pPr>
+            <a:r>
+              <a:rPr lang="en-US" sz="1400" b="1" dirty="0">
+                <a:solidFill>
+                  <a:srgbClr val="122956"/>
+                </a:solidFill>
+              </a:rPr>
+              <a:t>	</a:t>
+            </a:r>
+            <a:r>
+              <a:rPr lang="en-US" sz="1400" b="1" dirty="0" err="1">
+                <a:solidFill>
+                  <a:srgbClr val="122956"/>
+                </a:solidFill>
+              </a:rPr>
+              <a:t>keyboardToolbarHeight</a:t>
+            </a:r>
+            <a:r>
+              <a:rPr lang="en-US" sz="1400" b="1" dirty="0">
+                <a:solidFill>
+                  <a:srgbClr val="122956"/>
+                </a:solidFill>
+              </a:rPr>
+              <a:t>: 40</a:t>
+            </a:r>
+          </a:p>
+          <a:p>
+            <a:pPr>
+              <a:lnSpc>
+                <a:spcPct val="120000"/>
+              </a:lnSpc>
+            </a:pPr>
+            <a:r>
+              <a:rPr lang="en-US" sz="1400" dirty="0">
+                <a:solidFill>
+                  <a:srgbClr val="122956"/>
+                </a:solidFill>
+              </a:rPr>
+              <a:t>});</a:t>
+            </a:r>
+          </a:p>
+          <a:p>
+            <a:pPr>
+              <a:lnSpc>
+                <a:spcPct val="120000"/>
+              </a:lnSpc>
+            </a:pPr>
+            <a:endParaRPr lang="en-US" sz="1400" dirty="0">
+              <a:solidFill>
+                <a:srgbClr val="122956"/>
+              </a:solidFill>
+            </a:endParaRPr>
+          </a:p>
+        </p:txBody>
+      </p:sp>
+    </p:spTree>
+    <p:extLst>
+      <p:ext uri="{BB962C8B-B14F-4D97-AF65-F5344CB8AC3E}">
+        <p14:creationId xmlns:p14="http://schemas.microsoft.com/office/powerpoint/2010/main" val="1003603186"/>
+      </p:ext>
+    </p:extLst>
+  </p:cSld>
+  <p:clrMapOvr>
+    <a:masterClrMapping/>
+  </p:clrMapOvr>
+  <p:timing>
+    <p:tnLst>
+      <p:par>
+        <p:cTn xmlns:p14="http://schemas.microsoft.com/office/powerpoint/2010/main" id="1" dur="indefinite" restart="never" nodeType="tmRoot"/>
+      </p:par>
+    </p:tnLst>
+  </p:timing>
+</p:sld>
+</file>
+
+<file path=ppt/slides/slide11.xml><?xml version="1.0" encoding="utf-8"?>
+<p:sld xmlns:a="http://schemas.openxmlformats.org/drawingml/2006/main" xmlns:r="http://schemas.openxmlformats.org/officeDocument/2006/relationships" xmlns:p="http://schemas.openxmlformats.org/presentationml/2006/main">
+  <p:cSld>
+    <p:spTree>
+      <p:nvGrpSpPr>
+        <p:cNvPr id="1" name=""/>
+        <p:cNvGrpSpPr/>
+        <p:nvPr/>
+      </p:nvGrpSpPr>
+      <p:grpSpPr>
+        <a:xfrm>
+          <a:off x="0" y="0"/>
+          <a:ext cx="0" cy="0"/>
+          <a:chOff x="0" y="0"/>
+          <a:chExt cx="0" cy="0"/>
+        </a:xfrm>
+      </p:grpSpPr>
+      <p:sp>
+        <p:nvSpPr>
+          <p:cNvPr id="2" name="Title 1"/>
+          <p:cNvSpPr>
+            <a:spLocks noGrp="1"/>
+          </p:cNvSpPr>
+          <p:nvPr>
+            <p:ph type="title"/>
+          </p:nvPr>
+        </p:nvSpPr>
+        <p:spPr/>
+        <p:txBody>
+          <a:bodyPr/>
+          <a:lstStyle/>
+          <a:p>
+            <a:r>
+              <a:rPr lang="en-US" dirty="0" smtClean="0"/>
+              <a:t>Using Web Views and HTML Forms</a:t>
+            </a:r>
+            <a:endParaRPr lang="en-US" dirty="0"/>
+          </a:p>
+        </p:txBody>
+      </p:sp>
+      <p:sp>
+        <p:nvSpPr>
+          <p:cNvPr id="3" name="Content Placeholder 2"/>
+          <p:cNvSpPr>
+            <a:spLocks noGrp="1"/>
+          </p:cNvSpPr>
+          <p:nvPr>
+            <p:ph idx="1"/>
+          </p:nvPr>
+        </p:nvSpPr>
+        <p:spPr/>
+        <p:txBody>
+          <a:bodyPr/>
+          <a:lstStyle/>
+          <a:p>
+            <a:endParaRPr lang="en-US" dirty="0" smtClean="0"/>
+          </a:p>
+        </p:txBody>
+      </p:sp>
+    </p:spTree>
+    <p:extLst>
+      <p:ext uri="{BB962C8B-B14F-4D97-AF65-F5344CB8AC3E}">
+        <p14:creationId xmlns:p14="http://schemas.microsoft.com/office/powerpoint/2010/main" val="4124128645"/>
+      </p:ext>
+    </p:extLst>
+  </p:cSld>
+  <p:clrMapOvr>
+    <a:masterClrMapping/>
+  </p:clrMapOvr>
+  <p:timing>
+    <p:tnLst>
+      <p:par>
+        <p:cTn xmlns:p14="http://schemas.microsoft.com/office/powerpoint/2010/main" id="1" dur="indefinite" restart="never" nodeType="tmRoot"/>
+      </p:par>
+    </p:tnLst>
+  </p:timing>
+</p:sld>
+</file>
+
+<file path=ppt/slides/slide12.xml><?xml version="1.0" encoding="utf-8"?>
+<p:sld xmlns:a="http://schemas.openxmlformats.org/drawingml/2006/main" xmlns:r="http://schemas.openxmlformats.org/officeDocument/2006/relationships" xmlns:p="http://schemas.openxmlformats.org/presentationml/2006/main">
+  <p:cSld>
+    <p:spTree>
+      <p:nvGrpSpPr>
+        <p:cNvPr id="1" name=""/>
+        <p:cNvGrpSpPr/>
+        <p:nvPr/>
+      </p:nvGrpSpPr>
+      <p:grpSpPr>
+        <a:xfrm>
+          <a:off x="0" y="0"/>
+          <a:ext cx="0" cy="0"/>
+          <a:chOff x="0" y="0"/>
+          <a:chExt cx="0" cy="0"/>
+        </a:xfrm>
+      </p:grpSpPr>
+      <p:pic>
+        <p:nvPicPr>
+          <p:cNvPr id="23553" name="Picture 5" descr="raised_paper.png"/>
+          <p:cNvPicPr>
+            <a:picLocks noChangeAspect="1"/>
+          </p:cNvPicPr>
+          <p:nvPr/>
+        </p:nvPicPr>
+        <p:blipFill>
+          <a:blip r:embed="rId2">
+            <a:extLst>
+              <a:ext uri="{28A0092B-C50C-407E-A947-70E740481C1C}">
+                <a14:useLocalDpi xmlns:a14="http://schemas.microsoft.com/office/drawing/2010/main" val="0"/>
+              </a:ext>
+            </a:extLst>
+          </a:blip>
+          <a:srcRect/>
+          <a:stretch>
+            <a:fillRect/>
+          </a:stretch>
+        </p:blipFill>
+        <p:spPr bwMode="auto">
+          <a:xfrm>
+            <a:off x="1336675" y="2106613"/>
+            <a:ext cx="6456363" cy="2189162"/>
+          </a:xfrm>
+          <a:prstGeom prst="rect">
+            <a:avLst/>
+          </a:prstGeom>
+          <a:noFill/>
+          <a:ln>
+            <a:noFill/>
+          </a:ln>
+          <a:extLst>
+            <a:ext uri="{909E8E84-426E-40dd-AFC4-6F175D3DCCD1}">
+              <a14:hiddenFill xmlns:a14="http://schemas.microsoft.com/office/drawing/2010/main">
+                <a:solidFill>
+                  <a:srgbClr val="FFFFFF"/>
+                </a:solidFill>
+              </a14:hiddenFill>
+            </a:ext>
+            <a:ext uri="{91240B29-F687-4f45-9708-019B960494DF}">
+              <a14:hiddenLine xmlns:a14="http://schemas.microsoft.com/office/drawing/2010/main" w="9525">
+                <a:solidFill>
+                  <a:srgbClr val="000000"/>
+                </a:solidFill>
+                <a:miter lim="800000"/>
+                <a:headEnd/>
+                <a:tailEnd/>
+              </a14:hiddenLine>
+            </a:ext>
+          </a:extLst>
+        </p:spPr>
+      </p:pic>
+      <p:sp>
+        <p:nvSpPr>
+          <p:cNvPr id="23554" name="Title 1"/>
+          <p:cNvSpPr>
+            <a:spLocks noGrp="1"/>
+          </p:cNvSpPr>
+          <p:nvPr>
+            <p:ph type="ctrTitle" idx="4294967295"/>
+          </p:nvPr>
+        </p:nvSpPr>
+        <p:spPr>
+          <a:xfrm>
+            <a:off x="766763" y="2330450"/>
+            <a:ext cx="7772400" cy="1470025"/>
+          </a:xfrm>
+        </p:spPr>
+        <p:txBody>
+          <a:bodyPr/>
+          <a:lstStyle/>
+          <a:p>
+            <a:pPr algn="ctr"/>
+            <a:r>
+              <a:rPr lang="en-US" sz="4800" i="1" dirty="0" smtClean="0">
+                <a:solidFill>
+                  <a:srgbClr val="122956"/>
+                </a:solidFill>
+                <a:latin typeface="Trebuchet MS" charset="0"/>
+              </a:rPr>
+              <a:t>Q&amp;A</a:t>
+            </a:r>
+            <a:endParaRPr lang="en-US" sz="4800" i="1" dirty="0">
+              <a:solidFill>
+                <a:srgbClr val="122956"/>
+              </a:solidFill>
+              <a:latin typeface="Trebuchet MS" charset="0"/>
+            </a:endParaRPr>
+          </a:p>
+        </p:txBody>
+      </p:sp>
+    </p:spTree>
+    <p:extLst>
+      <p:ext uri="{BB962C8B-B14F-4D97-AF65-F5344CB8AC3E}">
+        <p14:creationId xmlns:p14="http://schemas.microsoft.com/office/powerpoint/2010/main" val="4095999683"/>
+      </p:ext>
+    </p:extLst>
+  </p:cSld>
+  <p:clrMapOvr>
+    <a:masterClrMapping/>
+  </p:clrMapOvr>
+</p:sld>
+</file>
+
+<file path=ppt/slides/slide13.xml><?xml version="1.0" encoding="utf-8"?>
+<p:sld xmlns:a="http://schemas.openxmlformats.org/drawingml/2006/main" xmlns:r="http://schemas.openxmlformats.org/officeDocument/2006/relationships" xmlns:p="http://schemas.openxmlformats.org/presentationml/2006/main">
+  <p:cSld>
+    <p:spTree>
+      <p:nvGrpSpPr>
+        <p:cNvPr id="1" name=""/>
+        <p:cNvGrpSpPr/>
+        <p:nvPr/>
+      </p:nvGrpSpPr>
+      <p:grpSpPr>
+        <a:xfrm>
+          <a:off x="0" y="0"/>
+          <a:ext cx="0" cy="0"/>
+          <a:chOff x="0" y="0"/>
+          <a:chExt cx="0" cy="0"/>
+        </a:xfrm>
+      </p:grpSpPr>
+      <p:sp>
+        <p:nvSpPr>
+          <p:cNvPr id="2" name="Title 1"/>
+          <p:cNvSpPr>
+            <a:spLocks noGrp="1"/>
+          </p:cNvSpPr>
+          <p:nvPr>
+            <p:ph type="title"/>
+          </p:nvPr>
+        </p:nvSpPr>
+        <p:spPr/>
+        <p:txBody>
+          <a:bodyPr/>
+          <a:lstStyle/>
+          <a:p>
+            <a:r>
+              <a:rPr lang="en-US" dirty="0" smtClean="0"/>
+              <a:t>Lab goals</a:t>
+            </a:r>
+            <a:endParaRPr lang="en-US" dirty="0"/>
+          </a:p>
+        </p:txBody>
+      </p:sp>
+    </p:spTree>
+    <p:extLst>
+      <p:ext uri="{BB962C8B-B14F-4D97-AF65-F5344CB8AC3E}">
+        <p14:creationId xmlns:p14="http://schemas.microsoft.com/office/powerpoint/2010/main" val="1237345480"/>
+      </p:ext>
+    </p:extLst>
+  </p:cSld>
+  <p:clrMapOvr>
+    <a:masterClrMapping/>
+  </p:clrMapOvr>
+</p:sld>
+</file>
+
+<file path=ppt/slides/slide14.xml><?xml version="1.0" encoding="utf-8"?>
 <p:sld xmlns:a="http://schemas.openxmlformats.org/drawingml/2006/main" xmlns:r="http://schemas.openxmlformats.org/officeDocument/2006/relationships" xmlns:p="http://schemas.openxmlformats.org/presentationml/2006/main">
   <p:cSld>
     <p:spTree>
@@ -8935,16 +10249,17 @@
           <a:p>
             <a:r>
               <a:rPr lang="en-US" dirty="0" smtClean="0"/>
+              <a:t>Keyboard Type</a:t>
+            </a:r>
+            <a:endParaRPr lang="en-US" dirty="0" smtClean="0"/>
+          </a:p>
+          <a:p>
+            <a:endParaRPr lang="en-US" dirty="0"/>
+          </a:p>
+          <a:p>
+            <a:r>
+              <a:rPr lang="en-US" dirty="0" smtClean="0"/>
               <a:t>Assigning the Return key</a:t>
-            </a:r>
-          </a:p>
-          <a:p>
-            <a:endParaRPr lang="en-US" dirty="0"/>
-          </a:p>
-          <a:p>
-            <a:r>
-              <a:rPr lang="en-US" dirty="0" smtClean="0"/>
-              <a:t>Custom Keyboards</a:t>
             </a:r>
           </a:p>
           <a:p>
@@ -9013,35 +10328,701 @@
           <a:p>
             <a:r>
               <a:rPr lang="en-US" dirty="0" smtClean="0"/>
-              <a:t>Using Web Views and HTML Forms</a:t>
+              <a:t>Keyboard Types - </a:t>
+            </a:r>
+            <a:r>
+              <a:rPr lang="en-US" dirty="0" err="1" smtClean="0"/>
+              <a:t>iOS</a:t>
             </a:r>
             <a:endParaRPr lang="en-US" dirty="0"/>
+          </a:p>
+        </p:txBody>
+      </p:sp>
+      <p:grpSp>
+        <p:nvGrpSpPr>
+          <p:cNvPr id="28" name="Group 27"/>
+          <p:cNvGrpSpPr/>
+          <p:nvPr/>
+        </p:nvGrpSpPr>
+        <p:grpSpPr>
+          <a:xfrm>
+            <a:off x="679634" y="1318352"/>
+            <a:ext cx="7844330" cy="1515745"/>
+            <a:chOff x="679634" y="1318352"/>
+            <a:chExt cx="7844330" cy="1515745"/>
+          </a:xfrm>
+        </p:grpSpPr>
+        <p:pic>
+          <p:nvPicPr>
+            <p:cNvPr id="27" name="Picture 26" descr="Screenshot_28.png"/>
+            <p:cNvPicPr>
+              <a:picLocks noChangeAspect="1"/>
+            </p:cNvPicPr>
+            <p:nvPr/>
+          </p:nvPicPr>
+          <p:blipFill>
+            <a:blip r:embed="rId3">
+              <a:extLst>
+                <a:ext uri="{28A0092B-C50C-407E-A947-70E740481C1C}">
+                  <a14:useLocalDpi xmlns:a14="http://schemas.microsoft.com/office/drawing/2010/main" val="0"/>
+                </a:ext>
+              </a:extLst>
+            </a:blip>
+            <a:stretch>
+              <a:fillRect/>
+            </a:stretch>
+          </p:blipFill>
+          <p:spPr>
+            <a:xfrm>
+              <a:off x="679634" y="1325337"/>
+              <a:ext cx="2235200" cy="1501775"/>
+            </a:xfrm>
+            <a:prstGeom prst="rect">
+              <a:avLst/>
+            </a:prstGeom>
+          </p:spPr>
+        </p:pic>
+        <p:pic>
+          <p:nvPicPr>
+            <p:cNvPr id="7" name="Picture 6" descr="Screenshot_21.png"/>
+            <p:cNvPicPr>
+              <a:picLocks noChangeAspect="1"/>
+            </p:cNvPicPr>
+            <p:nvPr/>
+          </p:nvPicPr>
+          <p:blipFill>
+            <a:blip r:embed="rId4">
+              <a:extLst>
+                <a:ext uri="{28A0092B-C50C-407E-A947-70E740481C1C}">
+                  <a14:useLocalDpi xmlns:a14="http://schemas.microsoft.com/office/drawing/2010/main" val="0"/>
+                </a:ext>
+              </a:extLst>
+            </a:blip>
+            <a:stretch>
+              <a:fillRect/>
+            </a:stretch>
+          </p:blipFill>
+          <p:spPr>
+            <a:xfrm>
+              <a:off x="3568196" y="1325337"/>
+              <a:ext cx="2235200" cy="1508760"/>
+            </a:xfrm>
+            <a:prstGeom prst="rect">
+              <a:avLst/>
+            </a:prstGeom>
+          </p:spPr>
+        </p:pic>
+        <p:pic>
+          <p:nvPicPr>
+            <p:cNvPr id="9" name="Picture 8" descr="Screenshot_22.png"/>
+            <p:cNvPicPr>
+              <a:picLocks noChangeAspect="1"/>
+            </p:cNvPicPr>
+            <p:nvPr/>
+          </p:nvPicPr>
+          <p:blipFill>
+            <a:blip r:embed="rId5">
+              <a:extLst>
+                <a:ext uri="{28A0092B-C50C-407E-A947-70E740481C1C}">
+                  <a14:useLocalDpi xmlns:a14="http://schemas.microsoft.com/office/drawing/2010/main" val="0"/>
+                </a:ext>
+              </a:extLst>
+            </a:blip>
+            <a:stretch>
+              <a:fillRect/>
+            </a:stretch>
+          </p:blipFill>
+          <p:spPr>
+            <a:xfrm>
+              <a:off x="6288764" y="1318352"/>
+              <a:ext cx="2235200" cy="1508760"/>
+            </a:xfrm>
+            <a:prstGeom prst="rect">
+              <a:avLst/>
+            </a:prstGeom>
+          </p:spPr>
+        </p:pic>
+      </p:grpSp>
+      <p:grpSp>
+        <p:nvGrpSpPr>
+          <p:cNvPr id="17" name="Group 16"/>
+          <p:cNvGrpSpPr/>
+          <p:nvPr/>
+        </p:nvGrpSpPr>
+        <p:grpSpPr>
+          <a:xfrm>
+            <a:off x="2022481" y="3155918"/>
+            <a:ext cx="5158637" cy="1501775"/>
+            <a:chOff x="1789737" y="3144676"/>
+            <a:chExt cx="5158637" cy="1501775"/>
+          </a:xfrm>
+        </p:grpSpPr>
+        <p:pic>
+          <p:nvPicPr>
+            <p:cNvPr id="10" name="Picture 9" descr="Screenshot_23.png"/>
+            <p:cNvPicPr>
+              <a:picLocks noChangeAspect="1"/>
+            </p:cNvPicPr>
+            <p:nvPr/>
+          </p:nvPicPr>
+          <p:blipFill>
+            <a:blip r:embed="rId6">
+              <a:extLst>
+                <a:ext uri="{28A0092B-C50C-407E-A947-70E740481C1C}">
+                  <a14:useLocalDpi xmlns:a14="http://schemas.microsoft.com/office/drawing/2010/main" val="0"/>
+                </a:ext>
+              </a:extLst>
+            </a:blip>
+            <a:stretch>
+              <a:fillRect/>
+            </a:stretch>
+          </p:blipFill>
+          <p:spPr>
+            <a:xfrm>
+              <a:off x="1789737" y="3144676"/>
+              <a:ext cx="2235200" cy="1501775"/>
+            </a:xfrm>
+            <a:prstGeom prst="rect">
+              <a:avLst/>
+            </a:prstGeom>
+          </p:spPr>
+        </p:pic>
+        <p:pic>
+          <p:nvPicPr>
+            <p:cNvPr id="12" name="Picture 11" descr="Screenshot_25.png"/>
+            <p:cNvPicPr>
+              <a:picLocks noChangeAspect="1"/>
+            </p:cNvPicPr>
+            <p:nvPr/>
+          </p:nvPicPr>
+          <p:blipFill>
+            <a:blip r:embed="rId7">
+              <a:extLst>
+                <a:ext uri="{28A0092B-C50C-407E-A947-70E740481C1C}">
+                  <a14:useLocalDpi xmlns:a14="http://schemas.microsoft.com/office/drawing/2010/main" val="0"/>
+                </a:ext>
+              </a:extLst>
+            </a:blip>
+            <a:stretch>
+              <a:fillRect/>
+            </a:stretch>
+          </p:blipFill>
+          <p:spPr>
+            <a:xfrm>
+              <a:off x="4713174" y="3144676"/>
+              <a:ext cx="2235200" cy="1501775"/>
+            </a:xfrm>
+            <a:prstGeom prst="rect">
+              <a:avLst/>
+            </a:prstGeom>
+          </p:spPr>
+        </p:pic>
+      </p:grpSp>
+      <p:grpSp>
+        <p:nvGrpSpPr>
+          <p:cNvPr id="16" name="Group 15"/>
+          <p:cNvGrpSpPr/>
+          <p:nvPr/>
+        </p:nvGrpSpPr>
+        <p:grpSpPr>
+          <a:xfrm>
+            <a:off x="728185" y="4986500"/>
+            <a:ext cx="7747229" cy="1508760"/>
+            <a:chOff x="451025" y="4880660"/>
+            <a:chExt cx="7747229" cy="1508760"/>
+          </a:xfrm>
+        </p:grpSpPr>
+        <p:pic>
+          <p:nvPicPr>
+            <p:cNvPr id="11" name="Picture 10" descr="Screenshot_24.png"/>
+            <p:cNvPicPr>
+              <a:picLocks noChangeAspect="1"/>
+            </p:cNvPicPr>
+            <p:nvPr/>
+          </p:nvPicPr>
+          <p:blipFill>
+            <a:blip r:embed="rId8">
+              <a:extLst>
+                <a:ext uri="{28A0092B-C50C-407E-A947-70E740481C1C}">
+                  <a14:useLocalDpi xmlns:a14="http://schemas.microsoft.com/office/drawing/2010/main" val="0"/>
+                </a:ext>
+              </a:extLst>
+            </a:blip>
+            <a:stretch>
+              <a:fillRect/>
+            </a:stretch>
+          </p:blipFill>
+          <p:spPr>
+            <a:xfrm>
+              <a:off x="451025" y="4880660"/>
+              <a:ext cx="2235200" cy="1508760"/>
+            </a:xfrm>
+            <a:prstGeom prst="rect">
+              <a:avLst/>
+            </a:prstGeom>
+          </p:spPr>
+        </p:pic>
+        <p:pic>
+          <p:nvPicPr>
+            <p:cNvPr id="13" name="Picture 12" descr="Screenshot_26.png"/>
+            <p:cNvPicPr>
+              <a:picLocks noChangeAspect="1"/>
+            </p:cNvPicPr>
+            <p:nvPr/>
+          </p:nvPicPr>
+          <p:blipFill>
+            <a:blip r:embed="rId9">
+              <a:extLst>
+                <a:ext uri="{28A0092B-C50C-407E-A947-70E740481C1C}">
+                  <a14:useLocalDpi xmlns:a14="http://schemas.microsoft.com/office/drawing/2010/main" val="0"/>
+                </a:ext>
+              </a:extLst>
+            </a:blip>
+            <a:stretch>
+              <a:fillRect/>
+            </a:stretch>
+          </p:blipFill>
+          <p:spPr>
+            <a:xfrm>
+              <a:off x="3207039" y="4884153"/>
+              <a:ext cx="2235200" cy="1501775"/>
+            </a:xfrm>
+            <a:prstGeom prst="rect">
+              <a:avLst/>
+            </a:prstGeom>
+          </p:spPr>
+        </p:pic>
+        <p:pic>
+          <p:nvPicPr>
+            <p:cNvPr id="14" name="Picture 13" descr="Screenshot_27.png"/>
+            <p:cNvPicPr>
+              <a:picLocks noChangeAspect="1"/>
+            </p:cNvPicPr>
+            <p:nvPr/>
+          </p:nvPicPr>
+          <p:blipFill>
+            <a:blip r:embed="rId10">
+              <a:extLst>
+                <a:ext uri="{28A0092B-C50C-407E-A947-70E740481C1C}">
+                  <a14:useLocalDpi xmlns:a14="http://schemas.microsoft.com/office/drawing/2010/main" val="0"/>
+                </a:ext>
+              </a:extLst>
+            </a:blip>
+            <a:stretch>
+              <a:fillRect/>
+            </a:stretch>
+          </p:blipFill>
+          <p:spPr>
+            <a:xfrm>
+              <a:off x="5963054" y="4884153"/>
+              <a:ext cx="2235200" cy="1501775"/>
+            </a:xfrm>
+            <a:prstGeom prst="rect">
+              <a:avLst/>
+            </a:prstGeom>
+          </p:spPr>
+        </p:pic>
+      </p:grpSp>
+      <p:sp>
+        <p:nvSpPr>
+          <p:cNvPr id="18" name="TextBox 17"/>
+          <p:cNvSpPr txBox="1"/>
+          <p:nvPr/>
+        </p:nvSpPr>
+        <p:spPr>
+          <a:xfrm>
+            <a:off x="983863" y="1216027"/>
+            <a:ext cx="1570262" cy="276999"/>
+          </a:xfrm>
+          <a:prstGeom prst="rect">
+            <a:avLst/>
+          </a:prstGeom>
+          <a:solidFill>
+            <a:schemeClr val="bg1"/>
+          </a:solidFill>
+          <a:ln w="12700">
+            <a:solidFill>
+              <a:schemeClr val="accent2"/>
+            </a:solidFill>
+          </a:ln>
+          <a:effectLst>
+            <a:outerShdw blurRad="50800" dist="38100" dir="2700000" algn="tl" rotWithShape="0">
+              <a:srgbClr val="000000">
+                <a:alpha val="43000"/>
+              </a:srgbClr>
+            </a:outerShdw>
+          </a:effectLst>
+        </p:spPr>
+        <p:txBody>
+          <a:bodyPr wrap="none" rtlCol="0">
+            <a:spAutoFit/>
+          </a:bodyPr>
+          <a:lstStyle/>
+          <a:p>
+            <a:pPr algn="ctr"/>
+            <a:r>
+              <a:rPr lang="en-US" sz="1200" dirty="0" smtClean="0">
+                <a:solidFill>
+                  <a:srgbClr val="122956"/>
+                </a:solidFill>
+              </a:rPr>
+              <a:t>KEYBOARD_DEFAULT</a:t>
+            </a:r>
+            <a:endParaRPr lang="en-US" sz="1200" dirty="0">
+              <a:solidFill>
+                <a:srgbClr val="122956"/>
+              </a:solidFill>
+            </a:endParaRPr>
           </a:p>
         </p:txBody>
       </p:sp>
       <p:sp>
         <p:nvSpPr>
-          <p:cNvPr id="3" name="Content Placeholder 2"/>
-          <p:cNvSpPr>
-            <a:spLocks noGrp="1"/>
-          </p:cNvSpPr>
-          <p:nvPr>
-            <p:ph idx="1"/>
-          </p:nvPr>
+          <p:cNvPr id="19" name="TextBox 18"/>
+          <p:cNvSpPr txBox="1"/>
+          <p:nvPr/>
         </p:nvSpPr>
-        <p:spPr/>
+        <p:spPr>
+          <a:xfrm>
+            <a:off x="3305939" y="1216027"/>
+            <a:ext cx="2685501" cy="276999"/>
+          </a:xfrm>
+          <a:prstGeom prst="rect">
+            <a:avLst/>
+          </a:prstGeom>
+          <a:solidFill>
+            <a:schemeClr val="bg1"/>
+          </a:solidFill>
+          <a:ln w="12700">
+            <a:solidFill>
+              <a:schemeClr val="accent2"/>
+            </a:solidFill>
+          </a:ln>
+          <a:effectLst>
+            <a:outerShdw blurRad="50800" dist="38100" dir="2700000" algn="tl" rotWithShape="0">
+              <a:srgbClr val="000000">
+                <a:alpha val="43000"/>
+              </a:srgbClr>
+            </a:outerShdw>
+          </a:effectLst>
+        </p:spPr>
         <p:txBody>
-          <a:bodyPr/>
+          <a:bodyPr wrap="none" rtlCol="0">
+            <a:spAutoFit/>
+          </a:bodyPr>
           <a:lstStyle/>
           <a:p>
-            <a:endParaRPr lang="en-US" dirty="0" smtClean="0"/>
+            <a:pPr algn="ctr"/>
+            <a:r>
+              <a:rPr lang="en-US" sz="1200" dirty="0"/>
+              <a:t>KEYBOARD_NUMBERS_PUNCTUATION</a:t>
+            </a:r>
+            <a:endParaRPr lang="en-US" sz="1200" dirty="0">
+              <a:solidFill>
+                <a:srgbClr val="122956"/>
+              </a:solidFill>
+            </a:endParaRPr>
+          </a:p>
+        </p:txBody>
+      </p:sp>
+      <p:sp>
+        <p:nvSpPr>
+          <p:cNvPr id="20" name="TextBox 19"/>
+          <p:cNvSpPr txBox="1"/>
+          <p:nvPr/>
+        </p:nvSpPr>
+        <p:spPr>
+          <a:xfrm>
+            <a:off x="6813625" y="1216027"/>
+            <a:ext cx="1251214" cy="276999"/>
+          </a:xfrm>
+          <a:prstGeom prst="rect">
+            <a:avLst/>
+          </a:prstGeom>
+          <a:solidFill>
+            <a:schemeClr val="bg1"/>
+          </a:solidFill>
+          <a:ln w="12700">
+            <a:solidFill>
+              <a:schemeClr val="accent2"/>
+            </a:solidFill>
+          </a:ln>
+          <a:effectLst>
+            <a:outerShdw blurRad="50800" dist="38100" dir="2700000" algn="tl" rotWithShape="0">
+              <a:srgbClr val="000000">
+                <a:alpha val="43000"/>
+              </a:srgbClr>
+            </a:outerShdw>
+          </a:effectLst>
+        </p:spPr>
+        <p:txBody>
+          <a:bodyPr wrap="none" rtlCol="0">
+            <a:spAutoFit/>
+          </a:bodyPr>
+          <a:lstStyle/>
+          <a:p>
+            <a:pPr algn="ctr"/>
+            <a:r>
+              <a:rPr lang="en-US" sz="1200" dirty="0"/>
+              <a:t>KEYBOARD_URL</a:t>
+            </a:r>
+            <a:endParaRPr lang="en-US" sz="1200" dirty="0">
+              <a:solidFill>
+                <a:srgbClr val="122956"/>
+              </a:solidFill>
+            </a:endParaRPr>
+          </a:p>
+        </p:txBody>
+      </p:sp>
+      <p:sp>
+        <p:nvSpPr>
+          <p:cNvPr id="21" name="TextBox 20"/>
+          <p:cNvSpPr txBox="1"/>
+          <p:nvPr/>
+        </p:nvSpPr>
+        <p:spPr>
+          <a:xfrm>
+            <a:off x="1002976" y="4851493"/>
+            <a:ext cx="1795008" cy="276999"/>
+          </a:xfrm>
+          <a:prstGeom prst="rect">
+            <a:avLst/>
+          </a:prstGeom>
+          <a:solidFill>
+            <a:schemeClr val="bg1"/>
+          </a:solidFill>
+          <a:ln w="12700">
+            <a:solidFill>
+              <a:schemeClr val="accent2"/>
+            </a:solidFill>
+          </a:ln>
+          <a:effectLst>
+            <a:outerShdw blurRad="50800" dist="38100" dir="2700000" algn="tl" rotWithShape="0">
+              <a:srgbClr val="000000">
+                <a:alpha val="43000"/>
+              </a:srgbClr>
+            </a:outerShdw>
+          </a:effectLst>
+        </p:spPr>
+        <p:txBody>
+          <a:bodyPr wrap="none" rtlCol="0">
+            <a:spAutoFit/>
+          </a:bodyPr>
+          <a:lstStyle/>
+          <a:p>
+            <a:pPr algn="ctr"/>
+            <a:r>
+              <a:rPr lang="en-US" sz="1200" dirty="0"/>
+              <a:t>KEYBOARD_PHONE_PAD</a:t>
+            </a:r>
+            <a:endParaRPr lang="en-US" sz="1200" dirty="0">
+              <a:solidFill>
+                <a:srgbClr val="122956"/>
+              </a:solidFill>
+            </a:endParaRPr>
+          </a:p>
+        </p:txBody>
+      </p:sp>
+      <p:sp>
+        <p:nvSpPr>
+          <p:cNvPr id="22" name="TextBox 21"/>
+          <p:cNvSpPr txBox="1"/>
+          <p:nvPr/>
+        </p:nvSpPr>
+        <p:spPr>
+          <a:xfrm>
+            <a:off x="3914678" y="4851493"/>
+            <a:ext cx="1387068" cy="276999"/>
+          </a:xfrm>
+          <a:prstGeom prst="rect">
+            <a:avLst/>
+          </a:prstGeom>
+          <a:solidFill>
+            <a:schemeClr val="bg1"/>
+          </a:solidFill>
+          <a:ln w="12700">
+            <a:solidFill>
+              <a:schemeClr val="accent2"/>
+            </a:solidFill>
+          </a:ln>
+          <a:effectLst>
+            <a:outerShdw blurRad="50800" dist="38100" dir="2700000" algn="tl" rotWithShape="0">
+              <a:srgbClr val="000000">
+                <a:alpha val="43000"/>
+              </a:srgbClr>
+            </a:outerShdw>
+          </a:effectLst>
+        </p:spPr>
+        <p:txBody>
+          <a:bodyPr wrap="none" rtlCol="0">
+            <a:spAutoFit/>
+          </a:bodyPr>
+          <a:lstStyle/>
+          <a:p>
+            <a:pPr algn="ctr"/>
+            <a:r>
+              <a:rPr lang="en-US" sz="1200" dirty="0"/>
+              <a:t>KEYBOARD_EMAIL</a:t>
+            </a:r>
+            <a:endParaRPr lang="en-US" sz="1200" dirty="0">
+              <a:solidFill>
+                <a:srgbClr val="122956"/>
+              </a:solidFill>
+            </a:endParaRPr>
+          </a:p>
+        </p:txBody>
+      </p:sp>
+      <p:sp>
+        <p:nvSpPr>
+          <p:cNvPr id="23" name="TextBox 22"/>
+          <p:cNvSpPr txBox="1"/>
+          <p:nvPr/>
+        </p:nvSpPr>
+        <p:spPr>
+          <a:xfrm>
+            <a:off x="6375750" y="4851493"/>
+            <a:ext cx="1913730" cy="276999"/>
+          </a:xfrm>
+          <a:prstGeom prst="rect">
+            <a:avLst/>
+          </a:prstGeom>
+          <a:solidFill>
+            <a:schemeClr val="bg1"/>
+          </a:solidFill>
+          <a:ln w="12700">
+            <a:solidFill>
+              <a:schemeClr val="accent2"/>
+            </a:solidFill>
+          </a:ln>
+          <a:effectLst>
+            <a:outerShdw blurRad="50800" dist="38100" dir="2700000" algn="tl" rotWithShape="0">
+              <a:srgbClr val="000000">
+                <a:alpha val="43000"/>
+              </a:srgbClr>
+            </a:outerShdw>
+          </a:effectLst>
+        </p:spPr>
+        <p:txBody>
+          <a:bodyPr wrap="none" rtlCol="0">
+            <a:spAutoFit/>
+          </a:bodyPr>
+          <a:lstStyle/>
+          <a:p>
+            <a:pPr algn="ctr"/>
+            <a:r>
+              <a:rPr lang="en-US" sz="1200" dirty="0"/>
+              <a:t>KEYBOARD_DECIMAL_PAD</a:t>
+            </a:r>
+            <a:endParaRPr lang="en-US" sz="1200" dirty="0">
+              <a:solidFill>
+                <a:srgbClr val="122956"/>
+              </a:solidFill>
+            </a:endParaRPr>
+          </a:p>
+        </p:txBody>
+      </p:sp>
+      <p:sp>
+        <p:nvSpPr>
+          <p:cNvPr id="24" name="TextBox 23"/>
+          <p:cNvSpPr txBox="1"/>
+          <p:nvPr/>
+        </p:nvSpPr>
+        <p:spPr>
+          <a:xfrm>
+            <a:off x="2197022" y="3017418"/>
+            <a:ext cx="1890436" cy="276999"/>
+          </a:xfrm>
+          <a:prstGeom prst="rect">
+            <a:avLst/>
+          </a:prstGeom>
+          <a:solidFill>
+            <a:schemeClr val="bg1"/>
+          </a:solidFill>
+          <a:ln w="12700">
+            <a:solidFill>
+              <a:schemeClr val="accent2"/>
+            </a:solidFill>
+          </a:ln>
+          <a:effectLst>
+            <a:outerShdw blurRad="50800" dist="38100" dir="2700000" algn="tl" rotWithShape="0">
+              <a:srgbClr val="000000">
+                <a:alpha val="43000"/>
+              </a:srgbClr>
+            </a:outerShdw>
+          </a:effectLst>
+        </p:spPr>
+        <p:txBody>
+          <a:bodyPr wrap="none" rtlCol="0">
+            <a:spAutoFit/>
+          </a:bodyPr>
+          <a:lstStyle/>
+          <a:p>
+            <a:pPr algn="ctr"/>
+            <a:r>
+              <a:rPr lang="en-US" sz="1200" dirty="0"/>
+              <a:t>KEYBOARD_NUMBER_PAD</a:t>
+            </a:r>
+            <a:endParaRPr lang="en-US" sz="1200" dirty="0">
+              <a:solidFill>
+                <a:srgbClr val="122956"/>
+              </a:solidFill>
+            </a:endParaRPr>
+          </a:p>
+        </p:txBody>
+      </p:sp>
+      <p:sp>
+        <p:nvSpPr>
+          <p:cNvPr id="25" name="TextBox 24"/>
+          <p:cNvSpPr txBox="1"/>
+          <p:nvPr/>
+        </p:nvSpPr>
+        <p:spPr>
+          <a:xfrm>
+            <a:off x="4987049" y="3017418"/>
+            <a:ext cx="2175596" cy="276999"/>
+          </a:xfrm>
+          <a:prstGeom prst="rect">
+            <a:avLst/>
+          </a:prstGeom>
+          <a:solidFill>
+            <a:schemeClr val="bg1"/>
+          </a:solidFill>
+          <a:ln w="12700">
+            <a:solidFill>
+              <a:schemeClr val="accent2"/>
+            </a:solidFill>
+          </a:ln>
+          <a:effectLst>
+            <a:outerShdw blurRad="50800" dist="38100" dir="2700000" algn="tl" rotWithShape="0">
+              <a:srgbClr val="000000">
+                <a:alpha val="43000"/>
+              </a:srgbClr>
+            </a:outerShdw>
+          </a:effectLst>
+        </p:spPr>
+        <p:txBody>
+          <a:bodyPr wrap="none" rtlCol="0">
+            <a:spAutoFit/>
+          </a:bodyPr>
+          <a:lstStyle/>
+          <a:p>
+            <a:pPr algn="ctr"/>
+            <a:r>
+              <a:rPr lang="en-US" sz="1200" dirty="0"/>
+              <a:t>KEYBOARD_NAMEPHONE_PAD</a:t>
+            </a:r>
+            <a:endParaRPr lang="en-US" sz="1200" dirty="0">
+              <a:solidFill>
+                <a:srgbClr val="122956"/>
+              </a:solidFill>
+            </a:endParaRPr>
           </a:p>
         </p:txBody>
       </p:sp>
     </p:spTree>
     <p:extLst>
       <p:ext uri="{BB962C8B-B14F-4D97-AF65-F5344CB8AC3E}">
-        <p14:creationId xmlns:p14="http://schemas.microsoft.com/office/powerpoint/2010/main" val="4124128645"/>
+        <p14:creationId xmlns:p14="http://schemas.microsoft.com/office/powerpoint/2010/main" val="1003603186"/>
       </p:ext>
     </p:extLst>
   </p:cSld>
@@ -9077,93 +11058,683 @@
       </p:grpSpPr>
       <p:pic>
         <p:nvPicPr>
-          <p:cNvPr id="23553" name="Picture 5" descr="raised_paper.png"/>
+          <p:cNvPr id="29" name="Picture 28" descr="numbers_punctuation.png"/>
           <p:cNvPicPr>
             <a:picLocks noChangeAspect="1"/>
           </p:cNvPicPr>
           <p:nvPr/>
         </p:nvPicPr>
         <p:blipFill>
-          <a:blip r:embed="rId2">
+          <a:blip r:embed="rId3">
             <a:extLst>
               <a:ext uri="{28A0092B-C50C-407E-A947-70E740481C1C}">
                 <a14:useLocalDpi xmlns:a14="http://schemas.microsoft.com/office/drawing/2010/main" val="0"/>
               </a:ext>
             </a:extLst>
           </a:blip>
-          <a:srcRect/>
           <a:stretch>
             <a:fillRect/>
           </a:stretch>
         </p:blipFill>
-        <p:spPr bwMode="auto">
+        <p:spPr>
           <a:xfrm>
-            <a:off x="1336675" y="2106613"/>
-            <a:ext cx="6456363" cy="2189162"/>
+            <a:off x="4833735" y="3132028"/>
+            <a:ext cx="2433320" cy="1671320"/>
           </a:xfrm>
           <a:prstGeom prst="rect">
             <a:avLst/>
           </a:prstGeom>
-          <a:noFill/>
-          <a:ln>
-            <a:noFill/>
-          </a:ln>
-          <a:extLst>
-            <a:ext uri="{909E8E84-426E-40dd-AFC4-6F175D3DCCD1}">
-              <a14:hiddenFill xmlns:a14="http://schemas.microsoft.com/office/drawing/2010/main">
-                <a:solidFill>
-                  <a:srgbClr val="FFFFFF"/>
-                </a:solidFill>
-              </a14:hiddenFill>
-            </a:ext>
-            <a:ext uri="{91240B29-F687-4f45-9708-019B960494DF}">
-              <a14:hiddenLine xmlns:a14="http://schemas.microsoft.com/office/drawing/2010/main" w="9525">
-                <a:solidFill>
-                  <a:srgbClr val="000000"/>
-                </a:solidFill>
-                <a:miter lim="800000"/>
-                <a:headEnd/>
-                <a:tailEnd/>
-              </a14:hiddenLine>
-            </a:ext>
-          </a:extLst>
+        </p:spPr>
+      </p:pic>
+      <p:pic>
+        <p:nvPicPr>
+          <p:cNvPr id="15" name="Picture 14" descr="numbers_punctuation.png"/>
+          <p:cNvPicPr>
+            <a:picLocks noChangeAspect="1"/>
+          </p:cNvPicPr>
+          <p:nvPr/>
+        </p:nvPicPr>
+        <p:blipFill>
+          <a:blip r:embed="rId3">
+            <a:extLst>
+              <a:ext uri="{28A0092B-C50C-407E-A947-70E740481C1C}">
+                <a14:useLocalDpi xmlns:a14="http://schemas.microsoft.com/office/drawing/2010/main" val="0"/>
+              </a:ext>
+            </a:extLst>
+          </a:blip>
+          <a:stretch>
+            <a:fillRect/>
+          </a:stretch>
+        </p:blipFill>
+        <p:spPr>
+          <a:xfrm>
+            <a:off x="3464675" y="1308308"/>
+            <a:ext cx="2433320" cy="1671320"/>
+          </a:xfrm>
+          <a:prstGeom prst="rect">
+            <a:avLst/>
+          </a:prstGeom>
+        </p:spPr>
+      </p:pic>
+      <p:pic>
+        <p:nvPicPr>
+          <p:cNvPr id="3" name="Picture 2" descr="default.png"/>
+          <p:cNvPicPr>
+            <a:picLocks noChangeAspect="1"/>
+          </p:cNvPicPr>
+          <p:nvPr/>
+        </p:nvPicPr>
+        <p:blipFill>
+          <a:blip r:embed="rId4">
+            <a:extLst>
+              <a:ext uri="{28A0092B-C50C-407E-A947-70E740481C1C}">
+                <a14:useLocalDpi xmlns:a14="http://schemas.microsoft.com/office/drawing/2010/main" val="0"/>
+              </a:ext>
+            </a:extLst>
+          </a:blip>
+          <a:stretch>
+            <a:fillRect/>
+          </a:stretch>
+        </p:blipFill>
+        <p:spPr>
+          <a:xfrm>
+            <a:off x="552940" y="1303228"/>
+            <a:ext cx="2428240" cy="1671320"/>
+          </a:xfrm>
+          <a:prstGeom prst="rect">
+            <a:avLst/>
+          </a:prstGeom>
+        </p:spPr>
+      </p:pic>
+      <p:pic>
+        <p:nvPicPr>
+          <p:cNvPr id="6" name="Picture 5" descr="url.png"/>
+          <p:cNvPicPr>
+            <a:picLocks noChangeAspect="1"/>
+          </p:cNvPicPr>
+          <p:nvPr/>
+        </p:nvPicPr>
+        <p:blipFill>
+          <a:blip r:embed="rId5">
+            <a:extLst>
+              <a:ext uri="{28A0092B-C50C-407E-A947-70E740481C1C}">
+                <a14:useLocalDpi xmlns:a14="http://schemas.microsoft.com/office/drawing/2010/main" val="0"/>
+              </a:ext>
+            </a:extLst>
+          </a:blip>
+          <a:stretch>
+            <a:fillRect/>
+          </a:stretch>
+        </p:blipFill>
+        <p:spPr>
+          <a:xfrm>
+            <a:off x="6258560" y="1308308"/>
+            <a:ext cx="2428240" cy="1661160"/>
+          </a:xfrm>
+          <a:prstGeom prst="rect">
+            <a:avLst/>
+          </a:prstGeom>
+        </p:spPr>
+      </p:pic>
+      <p:pic>
+        <p:nvPicPr>
+          <p:cNvPr id="5" name="Picture 4" descr="numbers.png"/>
+          <p:cNvPicPr>
+            <a:picLocks noChangeAspect="1"/>
+          </p:cNvPicPr>
+          <p:nvPr/>
+        </p:nvPicPr>
+        <p:blipFill>
+          <a:blip r:embed="rId6">
+            <a:extLst>
+              <a:ext uri="{28A0092B-C50C-407E-A947-70E740481C1C}">
+                <a14:useLocalDpi xmlns:a14="http://schemas.microsoft.com/office/drawing/2010/main" val="0"/>
+              </a:ext>
+            </a:extLst>
+          </a:blip>
+          <a:stretch>
+            <a:fillRect/>
+          </a:stretch>
+        </p:blipFill>
+        <p:spPr>
+          <a:xfrm>
+            <a:off x="2022481" y="3110028"/>
+            <a:ext cx="2438400" cy="1676400"/>
+          </a:xfrm>
+          <a:prstGeom prst="rect">
+            <a:avLst/>
+          </a:prstGeom>
+        </p:spPr>
+      </p:pic>
+      <p:pic>
+        <p:nvPicPr>
+          <p:cNvPr id="4" name="Picture 3" descr="phonepad.png"/>
+          <p:cNvPicPr>
+            <a:picLocks noChangeAspect="1"/>
+          </p:cNvPicPr>
+          <p:nvPr/>
+        </p:nvPicPr>
+        <p:blipFill>
+          <a:blip r:embed="rId7">
+            <a:extLst>
+              <a:ext uri="{28A0092B-C50C-407E-A947-70E740481C1C}">
+                <a14:useLocalDpi xmlns:a14="http://schemas.microsoft.com/office/drawing/2010/main" val="0"/>
+              </a:ext>
+            </a:extLst>
+          </a:blip>
+          <a:stretch>
+            <a:fillRect/>
+          </a:stretch>
+        </p:blipFill>
+        <p:spPr>
+          <a:xfrm>
+            <a:off x="675060" y="4991184"/>
+            <a:ext cx="2438400" cy="1666240"/>
+          </a:xfrm>
+          <a:prstGeom prst="rect">
+            <a:avLst/>
+          </a:prstGeom>
+        </p:spPr>
+      </p:pic>
+      <p:pic>
+        <p:nvPicPr>
+          <p:cNvPr id="8" name="Picture 7" descr="email.png"/>
+          <p:cNvPicPr>
+            <a:picLocks noChangeAspect="1"/>
+          </p:cNvPicPr>
+          <p:nvPr/>
+        </p:nvPicPr>
+        <p:blipFill>
+          <a:blip r:embed="rId8">
+            <a:extLst>
+              <a:ext uri="{28A0092B-C50C-407E-A947-70E740481C1C}">
+                <a14:useLocalDpi xmlns:a14="http://schemas.microsoft.com/office/drawing/2010/main" val="0"/>
+              </a:ext>
+            </a:extLst>
+          </a:blip>
+          <a:stretch>
+            <a:fillRect/>
+          </a:stretch>
+        </p:blipFill>
+        <p:spPr>
+          <a:xfrm>
+            <a:off x="3430414" y="4986104"/>
+            <a:ext cx="2438400" cy="1676400"/>
+          </a:xfrm>
+          <a:prstGeom prst="rect">
+            <a:avLst/>
+          </a:prstGeom>
         </p:spPr>
       </p:pic>
       <p:sp>
         <p:nvSpPr>
-          <p:cNvPr id="23554" name="Title 1"/>
+          <p:cNvPr id="2" name="Title 1"/>
           <p:cNvSpPr>
             <a:spLocks noGrp="1"/>
           </p:cNvSpPr>
           <p:nvPr>
-            <p:ph type="ctrTitle" idx="4294967295"/>
+            <p:ph type="title"/>
           </p:nvPr>
+        </p:nvSpPr>
+        <p:spPr/>
+        <p:txBody>
+          <a:bodyPr/>
+          <a:lstStyle/>
+          <a:p>
+            <a:r>
+              <a:rPr lang="en-US" dirty="0" smtClean="0"/>
+              <a:t>Keyboard Types - Android</a:t>
+            </a:r>
+            <a:endParaRPr lang="en-US" dirty="0"/>
+          </a:p>
+        </p:txBody>
+      </p:sp>
+      <p:sp>
+        <p:nvSpPr>
+          <p:cNvPr id="18" name="TextBox 17"/>
+          <p:cNvSpPr txBox="1"/>
+          <p:nvPr/>
         </p:nvSpPr>
         <p:spPr>
           <a:xfrm>
-            <a:off x="766763" y="2330450"/>
-            <a:ext cx="7772400" cy="1470025"/>
+            <a:off x="983863" y="1216027"/>
+            <a:ext cx="1570262" cy="276999"/>
           </a:xfrm>
+          <a:prstGeom prst="rect">
+            <a:avLst/>
+          </a:prstGeom>
+          <a:solidFill>
+            <a:schemeClr val="bg1"/>
+          </a:solidFill>
+          <a:ln w="12700">
+            <a:solidFill>
+              <a:schemeClr val="accent2"/>
+            </a:solidFill>
+          </a:ln>
+          <a:effectLst>
+            <a:outerShdw blurRad="50800" dist="38100" dir="2700000" algn="tl" rotWithShape="0">
+              <a:srgbClr val="000000">
+                <a:alpha val="43000"/>
+              </a:srgbClr>
+            </a:outerShdw>
+          </a:effectLst>
         </p:spPr>
         <p:txBody>
-          <a:bodyPr/>
+          <a:bodyPr wrap="none" rtlCol="0">
+            <a:spAutoFit/>
+          </a:bodyPr>
           <a:lstStyle/>
           <a:p>
             <a:pPr algn="ctr"/>
             <a:r>
-              <a:rPr lang="en-US" sz="4800" i="1" dirty="0" smtClean="0">
+              <a:rPr lang="en-US" sz="1200" dirty="0" smtClean="0">
                 <a:solidFill>
                   <a:srgbClr val="122956"/>
                 </a:solidFill>
-                <a:latin typeface="Trebuchet MS" charset="0"/>
               </a:rPr>
-              <a:t>Q&amp;A</a:t>
-            </a:r>
-            <a:endParaRPr lang="en-US" sz="4800" i="1" dirty="0">
+              <a:t>KEYBOARD_DEFAULT</a:t>
+            </a:r>
+            <a:endParaRPr lang="en-US" sz="1200" dirty="0">
               <a:solidFill>
                 <a:srgbClr val="122956"/>
               </a:solidFill>
-              <a:latin typeface="Trebuchet MS" charset="0"/>
+            </a:endParaRPr>
+          </a:p>
+        </p:txBody>
+      </p:sp>
+      <p:sp>
+        <p:nvSpPr>
+          <p:cNvPr id="19" name="TextBox 18"/>
+          <p:cNvSpPr txBox="1"/>
+          <p:nvPr/>
+        </p:nvSpPr>
+        <p:spPr>
+          <a:xfrm>
+            <a:off x="3305939" y="1216027"/>
+            <a:ext cx="2685501" cy="276999"/>
+          </a:xfrm>
+          <a:prstGeom prst="rect">
+            <a:avLst/>
+          </a:prstGeom>
+          <a:solidFill>
+            <a:schemeClr val="bg1"/>
+          </a:solidFill>
+          <a:ln w="12700">
+            <a:solidFill>
+              <a:schemeClr val="accent2"/>
+            </a:solidFill>
+          </a:ln>
+          <a:effectLst>
+            <a:outerShdw blurRad="50800" dist="38100" dir="2700000" algn="tl" rotWithShape="0">
+              <a:srgbClr val="000000">
+                <a:alpha val="43000"/>
+              </a:srgbClr>
+            </a:outerShdw>
+          </a:effectLst>
+        </p:spPr>
+        <p:txBody>
+          <a:bodyPr wrap="none" rtlCol="0">
+            <a:spAutoFit/>
+          </a:bodyPr>
+          <a:lstStyle/>
+          <a:p>
+            <a:pPr algn="ctr"/>
+            <a:r>
+              <a:rPr lang="en-US" sz="1200" dirty="0"/>
+              <a:t>KEYBOARD_NUMBERS_PUNCTUATION</a:t>
+            </a:r>
+            <a:endParaRPr lang="en-US" sz="1200" dirty="0">
+              <a:solidFill>
+                <a:srgbClr val="122956"/>
+              </a:solidFill>
+            </a:endParaRPr>
+          </a:p>
+        </p:txBody>
+      </p:sp>
+      <p:sp>
+        <p:nvSpPr>
+          <p:cNvPr id="20" name="TextBox 19"/>
+          <p:cNvSpPr txBox="1"/>
+          <p:nvPr/>
+        </p:nvSpPr>
+        <p:spPr>
+          <a:xfrm>
+            <a:off x="6813625" y="1216027"/>
+            <a:ext cx="1251214" cy="276999"/>
+          </a:xfrm>
+          <a:prstGeom prst="rect">
+            <a:avLst/>
+          </a:prstGeom>
+          <a:solidFill>
+            <a:schemeClr val="bg1"/>
+          </a:solidFill>
+          <a:ln w="12700">
+            <a:solidFill>
+              <a:schemeClr val="accent2"/>
+            </a:solidFill>
+          </a:ln>
+          <a:effectLst>
+            <a:outerShdw blurRad="50800" dist="38100" dir="2700000" algn="tl" rotWithShape="0">
+              <a:srgbClr val="000000">
+                <a:alpha val="43000"/>
+              </a:srgbClr>
+            </a:outerShdw>
+          </a:effectLst>
+        </p:spPr>
+        <p:txBody>
+          <a:bodyPr wrap="none" rtlCol="0">
+            <a:spAutoFit/>
+          </a:bodyPr>
+          <a:lstStyle/>
+          <a:p>
+            <a:pPr algn="ctr"/>
+            <a:r>
+              <a:rPr lang="en-US" sz="1200" dirty="0"/>
+              <a:t>KEYBOARD_URL</a:t>
+            </a:r>
+            <a:endParaRPr lang="en-US" sz="1200" dirty="0">
+              <a:solidFill>
+                <a:srgbClr val="122956"/>
+              </a:solidFill>
+            </a:endParaRPr>
+          </a:p>
+        </p:txBody>
+      </p:sp>
+      <p:sp>
+        <p:nvSpPr>
+          <p:cNvPr id="21" name="TextBox 20"/>
+          <p:cNvSpPr txBox="1"/>
+          <p:nvPr/>
+        </p:nvSpPr>
+        <p:spPr>
+          <a:xfrm>
+            <a:off x="1002976" y="4851493"/>
+            <a:ext cx="1795008" cy="276999"/>
+          </a:xfrm>
+          <a:prstGeom prst="rect">
+            <a:avLst/>
+          </a:prstGeom>
+          <a:solidFill>
+            <a:schemeClr val="bg1"/>
+          </a:solidFill>
+          <a:ln w="12700">
+            <a:solidFill>
+              <a:schemeClr val="accent2"/>
+            </a:solidFill>
+          </a:ln>
+          <a:effectLst>
+            <a:outerShdw blurRad="50800" dist="38100" dir="2700000" algn="tl" rotWithShape="0">
+              <a:srgbClr val="000000">
+                <a:alpha val="43000"/>
+              </a:srgbClr>
+            </a:outerShdw>
+          </a:effectLst>
+        </p:spPr>
+        <p:txBody>
+          <a:bodyPr wrap="none" rtlCol="0">
+            <a:spAutoFit/>
+          </a:bodyPr>
+          <a:lstStyle/>
+          <a:p>
+            <a:pPr algn="ctr"/>
+            <a:r>
+              <a:rPr lang="en-US" sz="1200" dirty="0"/>
+              <a:t>KEYBOARD_PHONE_PAD</a:t>
+            </a:r>
+            <a:endParaRPr lang="en-US" sz="1200" dirty="0">
+              <a:solidFill>
+                <a:srgbClr val="122956"/>
+              </a:solidFill>
+            </a:endParaRPr>
+          </a:p>
+        </p:txBody>
+      </p:sp>
+      <p:sp>
+        <p:nvSpPr>
+          <p:cNvPr id="22" name="TextBox 21"/>
+          <p:cNvSpPr txBox="1"/>
+          <p:nvPr/>
+        </p:nvSpPr>
+        <p:spPr>
+          <a:xfrm>
+            <a:off x="3914678" y="4851493"/>
+            <a:ext cx="1387068" cy="276999"/>
+          </a:xfrm>
+          <a:prstGeom prst="rect">
+            <a:avLst/>
+          </a:prstGeom>
+          <a:solidFill>
+            <a:schemeClr val="bg1"/>
+          </a:solidFill>
+          <a:ln w="12700">
+            <a:solidFill>
+              <a:schemeClr val="accent2"/>
+            </a:solidFill>
+          </a:ln>
+          <a:effectLst>
+            <a:outerShdw blurRad="50800" dist="38100" dir="2700000" algn="tl" rotWithShape="0">
+              <a:srgbClr val="000000">
+                <a:alpha val="43000"/>
+              </a:srgbClr>
+            </a:outerShdw>
+          </a:effectLst>
+        </p:spPr>
+        <p:txBody>
+          <a:bodyPr wrap="none" rtlCol="0">
+            <a:spAutoFit/>
+          </a:bodyPr>
+          <a:lstStyle/>
+          <a:p>
+            <a:pPr algn="ctr"/>
+            <a:r>
+              <a:rPr lang="en-US" sz="1200" dirty="0"/>
+              <a:t>KEYBOARD_EMAIL</a:t>
+            </a:r>
+            <a:endParaRPr lang="en-US" sz="1200" dirty="0">
+              <a:solidFill>
+                <a:srgbClr val="122956"/>
+              </a:solidFill>
+            </a:endParaRPr>
+          </a:p>
+        </p:txBody>
+      </p:sp>
+      <p:sp>
+        <p:nvSpPr>
+          <p:cNvPr id="23" name="TextBox 22"/>
+          <p:cNvSpPr txBox="1"/>
+          <p:nvPr/>
+        </p:nvSpPr>
+        <p:spPr>
+          <a:xfrm>
+            <a:off x="6375750" y="4851493"/>
+            <a:ext cx="1913730" cy="276999"/>
+          </a:xfrm>
+          <a:prstGeom prst="rect">
+            <a:avLst/>
+          </a:prstGeom>
+          <a:solidFill>
+            <a:schemeClr val="bg1"/>
+          </a:solidFill>
+          <a:ln w="12700">
+            <a:solidFill>
+              <a:schemeClr val="accent2"/>
+            </a:solidFill>
+          </a:ln>
+          <a:effectLst>
+            <a:outerShdw blurRad="50800" dist="38100" dir="2700000" algn="tl" rotWithShape="0">
+              <a:srgbClr val="000000">
+                <a:alpha val="43000"/>
+              </a:srgbClr>
+            </a:outerShdw>
+          </a:effectLst>
+        </p:spPr>
+        <p:txBody>
+          <a:bodyPr wrap="none" rtlCol="0">
+            <a:spAutoFit/>
+          </a:bodyPr>
+          <a:lstStyle/>
+          <a:p>
+            <a:pPr algn="ctr"/>
+            <a:r>
+              <a:rPr lang="en-US" sz="1200" dirty="0"/>
+              <a:t>KEYBOARD_DECIMAL_PAD</a:t>
+            </a:r>
+            <a:endParaRPr lang="en-US" sz="1200" dirty="0">
+              <a:solidFill>
+                <a:srgbClr val="122956"/>
+              </a:solidFill>
+            </a:endParaRPr>
+          </a:p>
+        </p:txBody>
+      </p:sp>
+      <p:sp>
+        <p:nvSpPr>
+          <p:cNvPr id="24" name="TextBox 23"/>
+          <p:cNvSpPr txBox="1"/>
+          <p:nvPr/>
+        </p:nvSpPr>
+        <p:spPr>
+          <a:xfrm>
+            <a:off x="2197022" y="3017418"/>
+            <a:ext cx="1890436" cy="276999"/>
+          </a:xfrm>
+          <a:prstGeom prst="rect">
+            <a:avLst/>
+          </a:prstGeom>
+          <a:solidFill>
+            <a:schemeClr val="bg1"/>
+          </a:solidFill>
+          <a:ln w="12700">
+            <a:solidFill>
+              <a:schemeClr val="accent2"/>
+            </a:solidFill>
+          </a:ln>
+          <a:effectLst>
+            <a:outerShdw blurRad="50800" dist="38100" dir="2700000" algn="tl" rotWithShape="0">
+              <a:srgbClr val="000000">
+                <a:alpha val="43000"/>
+              </a:srgbClr>
+            </a:outerShdw>
+          </a:effectLst>
+        </p:spPr>
+        <p:txBody>
+          <a:bodyPr wrap="none" rtlCol="0">
+            <a:spAutoFit/>
+          </a:bodyPr>
+          <a:lstStyle/>
+          <a:p>
+            <a:pPr algn="ctr"/>
+            <a:r>
+              <a:rPr lang="en-US" sz="1200" dirty="0"/>
+              <a:t>KEYBOARD_NUMBER_PAD</a:t>
+            </a:r>
+            <a:endParaRPr lang="en-US" sz="1200" dirty="0">
+              <a:solidFill>
+                <a:srgbClr val="122956"/>
+              </a:solidFill>
+            </a:endParaRPr>
+          </a:p>
+        </p:txBody>
+      </p:sp>
+      <p:sp>
+        <p:nvSpPr>
+          <p:cNvPr id="25" name="TextBox 24"/>
+          <p:cNvSpPr txBox="1"/>
+          <p:nvPr/>
+        </p:nvSpPr>
+        <p:spPr>
+          <a:xfrm>
+            <a:off x="4987049" y="3017418"/>
+            <a:ext cx="2175596" cy="276999"/>
+          </a:xfrm>
+          <a:prstGeom prst="rect">
+            <a:avLst/>
+          </a:prstGeom>
+          <a:solidFill>
+            <a:schemeClr val="bg1"/>
+          </a:solidFill>
+          <a:ln w="12700">
+            <a:solidFill>
+              <a:schemeClr val="accent2"/>
+            </a:solidFill>
+          </a:ln>
+          <a:effectLst>
+            <a:outerShdw blurRad="50800" dist="38100" dir="2700000" algn="tl" rotWithShape="0">
+              <a:srgbClr val="000000">
+                <a:alpha val="43000"/>
+              </a:srgbClr>
+            </a:outerShdw>
+          </a:effectLst>
+        </p:spPr>
+        <p:txBody>
+          <a:bodyPr wrap="none" rtlCol="0">
+            <a:spAutoFit/>
+          </a:bodyPr>
+          <a:lstStyle/>
+          <a:p>
+            <a:pPr algn="ctr"/>
+            <a:r>
+              <a:rPr lang="en-US" sz="1200" dirty="0"/>
+              <a:t>KEYBOARD_NAMEPHONE_PAD</a:t>
+            </a:r>
+            <a:endParaRPr lang="en-US" sz="1200" dirty="0">
+              <a:solidFill>
+                <a:srgbClr val="122956"/>
+              </a:solidFill>
+            </a:endParaRPr>
+          </a:p>
+        </p:txBody>
+      </p:sp>
+      <p:sp>
+        <p:nvSpPr>
+          <p:cNvPr id="26" name="&quot;No&quot; Symbol 25"/>
+          <p:cNvSpPr/>
+          <p:nvPr/>
+        </p:nvSpPr>
+        <p:spPr>
+          <a:xfrm>
+            <a:off x="6870161" y="5291922"/>
+            <a:ext cx="793788" cy="793788"/>
+          </a:xfrm>
+          <a:prstGeom prst="noSmoking">
+            <a:avLst/>
+          </a:prstGeom>
+          <a:solidFill>
+            <a:schemeClr val="accent2">
+              <a:alpha val="73000"/>
+            </a:schemeClr>
+          </a:solidFill>
+          <a:scene3d>
+            <a:camera prst="orthographicFront"/>
+            <a:lightRig rig="threePt" dir="t"/>
+          </a:scene3d>
+          <a:sp3d>
+            <a:bevelT/>
+          </a:sp3d>
+        </p:spPr>
+        <p:style>
+          <a:lnRef idx="1">
+            <a:schemeClr val="accent1"/>
+          </a:lnRef>
+          <a:fillRef idx="3">
+            <a:schemeClr val="accent1"/>
+          </a:fillRef>
+          <a:effectRef idx="2">
+            <a:schemeClr val="accent1"/>
+          </a:effectRef>
+          <a:fontRef idx="minor">
+            <a:schemeClr val="lt1"/>
+          </a:fontRef>
+        </p:style>
+        <p:txBody>
+          <a:bodyPr rtlCol="0" anchor="ctr"/>
+          <a:lstStyle/>
+          <a:p>
+            <a:pPr algn="ctr"/>
+            <a:endParaRPr lang="en-US">
+              <a:solidFill>
+                <a:schemeClr val="tx1"/>
+              </a:solidFill>
             </a:endParaRPr>
           </a:p>
         </p:txBody>
@@ -9171,13 +11742,20 @@
     </p:spTree>
     <p:extLst>
       <p:ext uri="{BB962C8B-B14F-4D97-AF65-F5344CB8AC3E}">
-        <p14:creationId xmlns:p14="http://schemas.microsoft.com/office/powerpoint/2010/main" val="4095999683"/>
+        <p14:creationId xmlns:p14="http://schemas.microsoft.com/office/powerpoint/2010/main" val="3192631950"/>
       </p:ext>
     </p:extLst>
   </p:cSld>
   <p:clrMapOvr>
     <a:masterClrMapping/>
   </p:clrMapOvr>
+  <p:timing>
+    <p:tnLst>
+      <p:par>
+        <p:cTn xmlns:p14="http://schemas.microsoft.com/office/powerpoint/2010/main" id="1" dur="indefinite" restart="never" nodeType="tmRoot"/>
+      </p:par>
+    </p:tnLst>
+  </p:timing>
 </p:sld>
 </file>
 
@@ -9215,22 +11793,458 @@
           <a:p>
             <a:r>
               <a:rPr lang="en-US" dirty="0" smtClean="0"/>
-              <a:t>Lab goals</a:t>
+              <a:t>Return Key Options</a:t>
             </a:r>
             <a:endParaRPr lang="en-US" dirty="0"/>
           </a:p>
         </p:txBody>
       </p:sp>
+      <p:grpSp>
+        <p:nvGrpSpPr>
+          <p:cNvPr id="5" name="Group 4"/>
+          <p:cNvGrpSpPr/>
+          <p:nvPr/>
+        </p:nvGrpSpPr>
+        <p:grpSpPr>
+          <a:xfrm>
+            <a:off x="811731" y="1606924"/>
+            <a:ext cx="3651355" cy="2304202"/>
+            <a:chOff x="811731" y="1673074"/>
+            <a:chExt cx="3651355" cy="2304202"/>
+          </a:xfrm>
+        </p:grpSpPr>
+        <p:pic>
+          <p:nvPicPr>
+            <p:cNvPr id="12" name="Picture 11" descr="Screenshot_25.png"/>
+            <p:cNvPicPr>
+              <a:picLocks noChangeAspect="1"/>
+            </p:cNvPicPr>
+            <p:nvPr/>
+          </p:nvPicPr>
+          <p:blipFill>
+            <a:blip r:embed="rId3">
+              <a:extLst>
+                <a:ext uri="{28A0092B-C50C-407E-A947-70E740481C1C}">
+                  <a14:useLocalDpi xmlns:a14="http://schemas.microsoft.com/office/drawing/2010/main" val="0"/>
+                </a:ext>
+              </a:extLst>
+            </a:blip>
+            <a:stretch>
+              <a:fillRect/>
+            </a:stretch>
+          </p:blipFill>
+          <p:spPr>
+            <a:xfrm>
+              <a:off x="2227886" y="2475501"/>
+              <a:ext cx="2235200" cy="1501775"/>
+            </a:xfrm>
+            <a:prstGeom prst="rect">
+              <a:avLst/>
+            </a:prstGeom>
+          </p:spPr>
+        </p:pic>
+        <p:pic>
+          <p:nvPicPr>
+            <p:cNvPr id="9" name="Picture 8" descr="Screenshot_22.png"/>
+            <p:cNvPicPr>
+              <a:picLocks noChangeAspect="1"/>
+            </p:cNvPicPr>
+            <p:nvPr/>
+          </p:nvPicPr>
+          <p:blipFill>
+            <a:blip r:embed="rId4">
+              <a:extLst>
+                <a:ext uri="{28A0092B-C50C-407E-A947-70E740481C1C}">
+                  <a14:useLocalDpi xmlns:a14="http://schemas.microsoft.com/office/drawing/2010/main" val="0"/>
+                </a:ext>
+              </a:extLst>
+            </a:blip>
+            <a:stretch>
+              <a:fillRect/>
+            </a:stretch>
+          </p:blipFill>
+          <p:spPr>
+            <a:xfrm>
+              <a:off x="1755835" y="2205697"/>
+              <a:ext cx="2235200" cy="1508760"/>
+            </a:xfrm>
+            <a:prstGeom prst="rect">
+              <a:avLst/>
+            </a:prstGeom>
+          </p:spPr>
+        </p:pic>
+        <p:pic>
+          <p:nvPicPr>
+            <p:cNvPr id="7" name="Picture 6" descr="Screenshot_21.png"/>
+            <p:cNvPicPr>
+              <a:picLocks noChangeAspect="1"/>
+            </p:cNvPicPr>
+            <p:nvPr/>
+          </p:nvPicPr>
+          <p:blipFill>
+            <a:blip r:embed="rId5">
+              <a:extLst>
+                <a:ext uri="{28A0092B-C50C-407E-A947-70E740481C1C}">
+                  <a14:useLocalDpi xmlns:a14="http://schemas.microsoft.com/office/drawing/2010/main" val="0"/>
+                </a:ext>
+              </a:extLst>
+            </a:blip>
+            <a:stretch>
+              <a:fillRect/>
+            </a:stretch>
+          </p:blipFill>
+          <p:spPr>
+            <a:xfrm>
+              <a:off x="1283783" y="1935893"/>
+              <a:ext cx="2235200" cy="1508760"/>
+            </a:xfrm>
+            <a:prstGeom prst="rect">
+              <a:avLst/>
+            </a:prstGeom>
+          </p:spPr>
+        </p:pic>
+        <p:pic>
+          <p:nvPicPr>
+            <p:cNvPr id="27" name="Picture 26" descr="Screenshot_28.png"/>
+            <p:cNvPicPr>
+              <a:picLocks noChangeAspect="1"/>
+            </p:cNvPicPr>
+            <p:nvPr/>
+          </p:nvPicPr>
+          <p:blipFill>
+            <a:blip r:embed="rId6">
+              <a:extLst>
+                <a:ext uri="{28A0092B-C50C-407E-A947-70E740481C1C}">
+                  <a14:useLocalDpi xmlns:a14="http://schemas.microsoft.com/office/drawing/2010/main" val="0"/>
+                </a:ext>
+              </a:extLst>
+            </a:blip>
+            <a:stretch>
+              <a:fillRect/>
+            </a:stretch>
+          </p:blipFill>
+          <p:spPr>
+            <a:xfrm>
+              <a:off x="811731" y="1673074"/>
+              <a:ext cx="2235200" cy="1501775"/>
+            </a:xfrm>
+            <a:prstGeom prst="rect">
+              <a:avLst/>
+            </a:prstGeom>
+          </p:spPr>
+        </p:pic>
+      </p:grpSp>
+      <p:sp>
+        <p:nvSpPr>
+          <p:cNvPr id="26" name="TextBox 25"/>
+          <p:cNvSpPr txBox="1"/>
+          <p:nvPr/>
+        </p:nvSpPr>
+        <p:spPr>
+          <a:xfrm>
+            <a:off x="4776482" y="1847288"/>
+            <a:ext cx="3677998" cy="3485569"/>
+          </a:xfrm>
+          <a:prstGeom prst="rect">
+            <a:avLst/>
+          </a:prstGeom>
+          <a:solidFill>
+            <a:schemeClr val="bg1"/>
+          </a:solidFill>
+          <a:ln w="12700">
+            <a:solidFill>
+              <a:schemeClr val="accent2"/>
+            </a:solidFill>
+          </a:ln>
+          <a:effectLst>
+            <a:outerShdw blurRad="50800" dist="38100" dir="2700000" algn="tl" rotWithShape="0">
+              <a:srgbClr val="000000">
+                <a:alpha val="43000"/>
+              </a:srgbClr>
+            </a:outerShdw>
+          </a:effectLst>
+        </p:spPr>
+        <p:txBody>
+          <a:bodyPr wrap="none" rtlCol="0">
+            <a:spAutoFit/>
+          </a:bodyPr>
+          <a:lstStyle/>
+          <a:p>
+            <a:pPr>
+              <a:lnSpc>
+                <a:spcPct val="150000"/>
+              </a:lnSpc>
+            </a:pPr>
+            <a:r>
+              <a:rPr lang="en-US" sz="1400" b="1" u="sng" dirty="0"/>
+              <a:t>supported </a:t>
+            </a:r>
+            <a:r>
+              <a:rPr lang="en-US" sz="1400" b="1" u="sng" dirty="0" err="1"/>
+              <a:t>returnKeyTypes</a:t>
+            </a:r>
+            <a:endParaRPr lang="en-US" sz="1400" b="1" u="sng" dirty="0"/>
+          </a:p>
+          <a:p>
+            <a:pPr>
+              <a:lnSpc>
+                <a:spcPct val="130000"/>
+              </a:lnSpc>
+            </a:pPr>
+            <a:r>
+              <a:rPr lang="en-US" sz="1400" dirty="0" err="1"/>
+              <a:t>Titanium.UI.RETURNKEY_DEFAULT</a:t>
+            </a:r>
+            <a:endParaRPr lang="en-US" sz="1400" dirty="0"/>
+          </a:p>
+          <a:p>
+            <a:pPr>
+              <a:lnSpc>
+                <a:spcPct val="130000"/>
+              </a:lnSpc>
+            </a:pPr>
+            <a:r>
+              <a:rPr lang="en-US" sz="1400" dirty="0" err="1"/>
+              <a:t>Titanium.UI.RETURNKEY_GO</a:t>
+            </a:r>
+            <a:endParaRPr lang="en-US" sz="1400" dirty="0"/>
+          </a:p>
+          <a:p>
+            <a:pPr>
+              <a:lnSpc>
+                <a:spcPct val="130000"/>
+              </a:lnSpc>
+            </a:pPr>
+            <a:r>
+              <a:rPr lang="en-US" sz="1400" dirty="0" err="1"/>
+              <a:t>Titanium.UI.RETURNKEY_GOOGLE</a:t>
+            </a:r>
+            <a:endParaRPr lang="en-US" sz="1400" dirty="0"/>
+          </a:p>
+          <a:p>
+            <a:pPr>
+              <a:lnSpc>
+                <a:spcPct val="130000"/>
+              </a:lnSpc>
+            </a:pPr>
+            <a:r>
+              <a:rPr lang="en-US" sz="1400" dirty="0" err="1"/>
+              <a:t>Titanium.UI.RETURNKEY_JOIN</a:t>
+            </a:r>
+            <a:endParaRPr lang="en-US" sz="1400" dirty="0"/>
+          </a:p>
+          <a:p>
+            <a:pPr>
+              <a:lnSpc>
+                <a:spcPct val="130000"/>
+              </a:lnSpc>
+            </a:pPr>
+            <a:r>
+              <a:rPr lang="en-US" sz="1400" dirty="0" err="1"/>
+              <a:t>Titanium.UI.RETURNKEY_NEXT</a:t>
+            </a:r>
+            <a:endParaRPr lang="en-US" sz="1400" dirty="0"/>
+          </a:p>
+          <a:p>
+            <a:pPr>
+              <a:lnSpc>
+                <a:spcPct val="130000"/>
+              </a:lnSpc>
+            </a:pPr>
+            <a:r>
+              <a:rPr lang="en-US" sz="1400" dirty="0" err="1"/>
+              <a:t>Titanium.UI.RETURNKEY_ROUTE</a:t>
+            </a:r>
+            <a:endParaRPr lang="en-US" sz="1400" dirty="0"/>
+          </a:p>
+          <a:p>
+            <a:pPr>
+              <a:lnSpc>
+                <a:spcPct val="130000"/>
+              </a:lnSpc>
+            </a:pPr>
+            <a:r>
+              <a:rPr lang="en-US" sz="1400" dirty="0" err="1"/>
+              <a:t>Titanium.UI.RETURNKEY_SEARCH</a:t>
+            </a:r>
+            <a:endParaRPr lang="en-US" sz="1400" dirty="0"/>
+          </a:p>
+          <a:p>
+            <a:pPr>
+              <a:lnSpc>
+                <a:spcPct val="130000"/>
+              </a:lnSpc>
+            </a:pPr>
+            <a:r>
+              <a:rPr lang="en-US" sz="1400" dirty="0" err="1"/>
+              <a:t>Titanium.UI.RETURNKEY_SEND</a:t>
+            </a:r>
+            <a:endParaRPr lang="en-US" sz="1400" dirty="0"/>
+          </a:p>
+          <a:p>
+            <a:pPr>
+              <a:lnSpc>
+                <a:spcPct val="130000"/>
+              </a:lnSpc>
+            </a:pPr>
+            <a:r>
+              <a:rPr lang="en-US" sz="1400" dirty="0" err="1"/>
+              <a:t>Titanium.UI.RETURNKEY_YAHOO</a:t>
+            </a:r>
+            <a:endParaRPr lang="en-US" sz="1400" dirty="0"/>
+          </a:p>
+          <a:p>
+            <a:pPr>
+              <a:lnSpc>
+                <a:spcPct val="130000"/>
+              </a:lnSpc>
+            </a:pPr>
+            <a:r>
+              <a:rPr lang="en-US" sz="1400" dirty="0" err="1"/>
+              <a:t>Titanium.UI.RETURNKEY_DONE</a:t>
+            </a:r>
+            <a:endParaRPr lang="en-US" sz="1400" dirty="0"/>
+          </a:p>
+          <a:p>
+            <a:pPr>
+              <a:lnSpc>
+                <a:spcPct val="130000"/>
+              </a:lnSpc>
+            </a:pPr>
+            <a:r>
+              <a:rPr lang="en-US" sz="1400" dirty="0" err="1"/>
+              <a:t>Titanium.UI.RETURNKEY_EMERGENCY_CALL</a:t>
+            </a:r>
+            <a:endParaRPr lang="en-US" sz="1400" dirty="0">
+              <a:solidFill>
+                <a:srgbClr val="122956"/>
+              </a:solidFill>
+            </a:endParaRPr>
+          </a:p>
+        </p:txBody>
+      </p:sp>
+      <p:grpSp>
+        <p:nvGrpSpPr>
+          <p:cNvPr id="4" name="Group 3"/>
+          <p:cNvGrpSpPr/>
+          <p:nvPr/>
+        </p:nvGrpSpPr>
+        <p:grpSpPr>
+          <a:xfrm>
+            <a:off x="1083123" y="4115109"/>
+            <a:ext cx="3372344" cy="2065055"/>
+            <a:chOff x="618691" y="4597449"/>
+            <a:chExt cx="3372344" cy="2065055"/>
+          </a:xfrm>
+        </p:grpSpPr>
+        <p:pic>
+          <p:nvPicPr>
+            <p:cNvPr id="31" name="Picture 30" descr="email.png"/>
+            <p:cNvPicPr>
+              <a:picLocks noChangeAspect="1"/>
+            </p:cNvPicPr>
+            <p:nvPr/>
+          </p:nvPicPr>
+          <p:blipFill>
+            <a:blip r:embed="rId7">
+              <a:extLst>
+                <a:ext uri="{28A0092B-C50C-407E-A947-70E740481C1C}">
+                  <a14:useLocalDpi xmlns:a14="http://schemas.microsoft.com/office/drawing/2010/main" val="0"/>
+                </a:ext>
+              </a:extLst>
+            </a:blip>
+            <a:stretch>
+              <a:fillRect/>
+            </a:stretch>
+          </p:blipFill>
+          <p:spPr>
+            <a:xfrm>
+              <a:off x="1552635" y="4986104"/>
+              <a:ext cx="2438400" cy="1676400"/>
+            </a:xfrm>
+            <a:prstGeom prst="rect">
+              <a:avLst/>
+            </a:prstGeom>
+          </p:spPr>
+        </p:pic>
+        <p:pic>
+          <p:nvPicPr>
+            <p:cNvPr id="29" name="Picture 28" descr="numbers_punctuation.png"/>
+            <p:cNvPicPr>
+              <a:picLocks noChangeAspect="1"/>
+            </p:cNvPicPr>
+            <p:nvPr/>
+          </p:nvPicPr>
+          <p:blipFill>
+            <a:blip r:embed="rId8">
+              <a:extLst>
+                <a:ext uri="{28A0092B-C50C-407E-A947-70E740481C1C}">
+                  <a14:useLocalDpi xmlns:a14="http://schemas.microsoft.com/office/drawing/2010/main" val="0"/>
+                </a:ext>
+              </a:extLst>
+            </a:blip>
+            <a:stretch>
+              <a:fillRect/>
+            </a:stretch>
+          </p:blipFill>
+          <p:spPr>
+            <a:xfrm>
+              <a:off x="1083123" y="4791777"/>
+              <a:ext cx="2433320" cy="1671320"/>
+            </a:xfrm>
+            <a:prstGeom prst="rect">
+              <a:avLst/>
+            </a:prstGeom>
+          </p:spPr>
+        </p:pic>
+        <p:pic>
+          <p:nvPicPr>
+            <p:cNvPr id="30" name="Picture 29" descr="default.png"/>
+            <p:cNvPicPr>
+              <a:picLocks noChangeAspect="1"/>
+            </p:cNvPicPr>
+            <p:nvPr/>
+          </p:nvPicPr>
+          <p:blipFill>
+            <a:blip r:embed="rId9">
+              <a:extLst>
+                <a:ext uri="{28A0092B-C50C-407E-A947-70E740481C1C}">
+                  <a14:useLocalDpi xmlns:a14="http://schemas.microsoft.com/office/drawing/2010/main" val="0"/>
+                </a:ext>
+              </a:extLst>
+            </a:blip>
+            <a:stretch>
+              <a:fillRect/>
+            </a:stretch>
+          </p:blipFill>
+          <p:spPr>
+            <a:xfrm>
+              <a:off x="618691" y="4597449"/>
+              <a:ext cx="2428240" cy="1671320"/>
+            </a:xfrm>
+            <a:prstGeom prst="rect">
+              <a:avLst/>
+            </a:prstGeom>
+          </p:spPr>
+        </p:pic>
+      </p:grpSp>
     </p:spTree>
     <p:extLst>
       <p:ext uri="{BB962C8B-B14F-4D97-AF65-F5344CB8AC3E}">
-        <p14:creationId xmlns:p14="http://schemas.microsoft.com/office/powerpoint/2010/main" val="1237345480"/>
+        <p14:creationId xmlns:p14="http://schemas.microsoft.com/office/powerpoint/2010/main" val="1652703305"/>
       </p:ext>
     </p:extLst>
   </p:cSld>
   <p:clrMapOvr>
     <a:masterClrMapping/>
   </p:clrMapOvr>
+  <p:timing>
+    <p:tnLst>
+      <p:par>
+        <p:cTn xmlns:p14="http://schemas.microsoft.com/office/powerpoint/2010/main" id="1" dur="indefinite" restart="never" nodeType="tmRoot"/>
+      </p:par>
+    </p:tnLst>
+  </p:timing>
 </p:sld>
 </file>
 

</xml_diff>